<commit_message>
Fixes on lists basics slides
</commit_message>
<xml_diff>
--- a/Courses/Software-Sciences/Module-2-DS-and-Algo/02.1-Lists-Basics/02.1-Lists-Basics.pptx
+++ b/Courses/Software-Sciences/Module-2-DS-and-Algo/02.1-Lists-Basics/02.1-Lists-Basics.pptx
@@ -145,7 +145,7 @@
             <p14:sldId id="276"/>
           </p14:sldIdLst>
         </p14:section>
-        <p14:section name="Списъци" id="{75255194-587A-4A21-B155-F0650F50C22E}">
+        <p14:section name="Списък" id="{75255194-587A-4A21-B155-F0650F50C22E}">
           <p14:sldIdLst>
             <p14:sldId id="493"/>
             <p14:sldId id="492"/>
@@ -156,7 +156,7 @@
             <p14:sldId id="494"/>
           </p14:sldIdLst>
         </p14:section>
-        <p14:section name="Четене на листове от конзолата" id="{4D341BA8-2906-4632-BBCD-AFE393EE5B9E}">
+        <p14:section name="Четене и отпечатване на списък&#13;" id="{4D341BA8-2906-4632-BBCD-AFE393EE5B9E}">
           <p14:sldIdLst>
             <p14:sldId id="504"/>
             <p14:sldId id="505"/>
@@ -169,7 +169,7 @@
             <p14:sldId id="524"/>
           </p14:sldIdLst>
         </p14:section>
-        <p14:section name="Сортиране на списъци и масиви" id="{76D4156F-3A13-4126-BB8E-5436707FC4AB}">
+        <p14:section name="Сортиране на списък" id="{76D4156F-3A13-4126-BB8E-5436707FC4AB}">
           <p14:sldIdLst>
             <p14:sldId id="508"/>
             <p14:sldId id="509"/>
@@ -311,7 +311,7 @@
           <a:p>
             <a:fld id="{4E087215-0C8F-4762-A664-737A353EC9A4}" type="datetimeFigureOut">
               <a:rPr lang="bg-BG" smtClean="0"/>
-              <a:t>6.7.2023 г.</a:t>
+              <a:t>18.08.23 г.</a:t>
             </a:fld>
             <a:endParaRPr lang="bg-BG" dirty="0"/>
           </a:p>
@@ -502,7 +502,7 @@
           <a:p>
             <a:fld id="{72D84649-876A-46C9-8472-14CB09C070D8}" type="datetimeFigureOut">
               <a:rPr lang="en-US" smtClean="0"/>
-              <a:t>7/6/2023</a:t>
+              <a:t>8/18/23</a:t>
             </a:fld>
             <a:endParaRPr lang="en-US" dirty="0"/>
           </a:p>
@@ -1105,7 +1105,7 @@
           <a:bodyPr/>
           <a:lstStyle/>
           <a:p>
-            <a:endParaRPr lang="bg-BG" dirty="0"/>
+            <a:endParaRPr lang="en-BG" dirty="0"/>
           </a:p>
         </p:txBody>
       </p:sp>
@@ -1126,7 +1126,7 @@
           <a:p>
             <a:fld id="{2BF067CD-8E6B-4360-9AA8-C5DF2A48A6D1}" type="slidenum">
               <a:rPr lang="en-US" smtClean="0"/>
-              <a:t>4</a:t>
+              <a:t>3</a:t>
             </a:fld>
             <a:endParaRPr lang="en-US" dirty="0"/>
           </a:p>
@@ -1134,13 +1134,7 @@
       </p:sp>
       <p:sp>
         <p:nvSpPr>
-          <p:cNvPr id="7" name="Footer Placeholder 7">
-            <a:extLst>
-              <a:ext uri="{FF2B5EF4-FFF2-40B4-BE49-F238E27FC236}">
-                <a16:creationId xmlns:a16="http://schemas.microsoft.com/office/drawing/2014/main" id="{C663E775-B715-45B3-BD85-2BE7799CA3D7}"/>
-              </a:ext>
-            </a:extLst>
-          </p:cNvPr>
+          <p:cNvPr id="5" name="Footer Placeholder 4"/>
           <p:cNvSpPr>
             <a:spLocks noGrp="1"/>
           </p:cNvSpPr>
@@ -1148,44 +1142,33 @@
             <p:ph type="ftr" sz="quarter" idx="4"/>
           </p:nvPr>
         </p:nvSpPr>
-        <p:spPr>
-          <a:xfrm>
-            <a:off x="-1" y="8847000"/>
-            <a:ext cx="6488999" cy="297000"/>
-          </a:xfrm>
-          <a:prstGeom prst="rect">
-            <a:avLst/>
-          </a:prstGeom>
-        </p:spPr>
+        <p:spPr/>
         <p:txBody>
-          <a:bodyPr vert="horz" lIns="91440" tIns="45720" rIns="91440" bIns="45720" rtlCol="0" anchor="b"/>
-          <a:lstStyle>
-            <a:lvl1pPr algn="l">
-              <a:defRPr sz="1100"/>
-            </a:lvl1pPr>
-          </a:lstStyle>
-          <a:p>
-            <a:r>
-              <a:rPr lang="en-US" dirty="0"/>
+          <a:bodyPr/>
+          <a:lstStyle/>
+          <a:p>
+            <a:r>
+              <a:rPr lang="en-US"/>
               <a:t>© SoftUni – </a:t>
             </a:r>
             <a:r>
-              <a:rPr lang="en-US" u="sng" dirty="0">
+              <a:rPr lang="en-US" u="sng">
                 <a:hlinkClick r:id="rId3"/>
               </a:rPr>
               <a:t>https://softuni.org</a:t>
             </a:r>
             <a:r>
-              <a:rPr lang="en-US" dirty="0"/>
+              <a:rPr lang="en-US"/>
               <a:t>. Copyrighted document. Unauthorized copy or reproduction is not permitted.</a:t>
             </a:r>
+            <a:endParaRPr lang="en-US" dirty="0"/>
           </a:p>
         </p:txBody>
       </p:sp>
     </p:spTree>
     <p:extLst>
       <p:ext uri="{BB962C8B-B14F-4D97-AF65-F5344CB8AC3E}">
-        <p14:creationId xmlns:p14="http://schemas.microsoft.com/office/powerpoint/2010/main" val="39802663"/>
+        <p14:creationId xmlns:p14="http://schemas.microsoft.com/office/powerpoint/2010/main" val="3767345747"/>
       </p:ext>
     </p:extLst>
   </p:cSld>
@@ -1250,7 +1233,7 @@
             <a:spLocks noGrp="1"/>
           </p:cNvSpPr>
           <p:nvPr>
-            <p:ph type="sldNum" sz="quarter" idx="10"/>
+            <p:ph type="sldNum" sz="quarter" idx="5"/>
           </p:nvPr>
         </p:nvSpPr>
         <p:spPr/>
@@ -1260,7 +1243,7 @@
           <a:p>
             <a:fld id="{2BF067CD-8E6B-4360-9AA8-C5DF2A48A6D1}" type="slidenum">
               <a:rPr lang="en-US" smtClean="0"/>
-              <a:t>18</a:t>
+              <a:t>4</a:t>
             </a:fld>
             <a:endParaRPr lang="en-US" dirty="0"/>
           </a:p>
@@ -1271,7 +1254,7 @@
           <p:cNvPr id="7" name="Footer Placeholder 7">
             <a:extLst>
               <a:ext uri="{FF2B5EF4-FFF2-40B4-BE49-F238E27FC236}">
-                <a16:creationId xmlns:a16="http://schemas.microsoft.com/office/drawing/2014/main" id="{C871A23B-5C38-4F54-886A-15CDA6D88DF6}"/>
+                <a16:creationId xmlns:a16="http://schemas.microsoft.com/office/drawing/2014/main" id="{C663E775-B715-45B3-BD85-2BE7799CA3D7}"/>
               </a:ext>
             </a:extLst>
           </p:cNvPr>
@@ -1319,7 +1302,7 @@
     </p:spTree>
     <p:extLst>
       <p:ext uri="{BB962C8B-B14F-4D97-AF65-F5344CB8AC3E}">
-        <p14:creationId xmlns:p14="http://schemas.microsoft.com/office/powerpoint/2010/main" val="503613592"/>
+        <p14:creationId xmlns:p14="http://schemas.microsoft.com/office/powerpoint/2010/main" val="39802663"/>
       </p:ext>
     </p:extLst>
   </p:cSld>
@@ -1373,18 +1356,18 @@
           <a:bodyPr/>
           <a:lstStyle/>
           <a:p>
-            <a:endParaRPr lang="en-US" dirty="0"/>
+            <a:endParaRPr lang="en-BG" dirty="0"/>
           </a:p>
         </p:txBody>
       </p:sp>
       <p:sp>
         <p:nvSpPr>
-          <p:cNvPr id="5" name="Slide Number Placeholder 4"/>
+          <p:cNvPr id="4" name="Slide Number Placeholder 3"/>
           <p:cNvSpPr>
             <a:spLocks noGrp="1"/>
           </p:cNvSpPr>
           <p:nvPr>
-            <p:ph type="sldNum" sz="quarter" idx="11"/>
+            <p:ph type="sldNum" sz="quarter" idx="5"/>
           </p:nvPr>
         </p:nvSpPr>
         <p:spPr/>
@@ -1392,10 +1375,9 @@
           <a:bodyPr/>
           <a:lstStyle/>
           <a:p>
-            <a:fld id="{3EBA5BD7-F043-4D1B-AA17-CD412FC534DE}" type="slidenum">
+            <a:fld id="{2BF067CD-8E6B-4360-9AA8-C5DF2A48A6D1}" type="slidenum">
               <a:rPr lang="en-US" smtClean="0"/>
-              <a:pPr/>
-              <a:t>25</a:t>
+              <a:t>15</a:t>
             </a:fld>
             <a:endParaRPr lang="en-US" dirty="0"/>
           </a:p>
@@ -1403,13 +1385,7 @@
       </p:sp>
       <p:sp>
         <p:nvSpPr>
-          <p:cNvPr id="6" name="Footer Placeholder 7">
-            <a:extLst>
-              <a:ext uri="{FF2B5EF4-FFF2-40B4-BE49-F238E27FC236}">
-                <a16:creationId xmlns:a16="http://schemas.microsoft.com/office/drawing/2014/main" id="{BFF5DFD4-93B8-42D0-AC25-A8E58301E736}"/>
-              </a:ext>
-            </a:extLst>
-          </p:cNvPr>
+          <p:cNvPr id="5" name="Footer Placeholder 4"/>
           <p:cNvSpPr>
             <a:spLocks noGrp="1"/>
           </p:cNvSpPr>
@@ -1417,44 +1393,33 @@
             <p:ph type="ftr" sz="quarter" idx="4"/>
           </p:nvPr>
         </p:nvSpPr>
-        <p:spPr>
-          <a:xfrm>
-            <a:off x="-1" y="8847000"/>
-            <a:ext cx="6488999" cy="297000"/>
-          </a:xfrm>
-          <a:prstGeom prst="rect">
-            <a:avLst/>
-          </a:prstGeom>
-        </p:spPr>
+        <p:spPr/>
         <p:txBody>
-          <a:bodyPr vert="horz" lIns="91440" tIns="45720" rIns="91440" bIns="45720" rtlCol="0" anchor="b"/>
-          <a:lstStyle>
-            <a:lvl1pPr algn="l">
-              <a:defRPr sz="1100"/>
-            </a:lvl1pPr>
-          </a:lstStyle>
-          <a:p>
-            <a:r>
-              <a:rPr lang="en-US" dirty="0"/>
+          <a:bodyPr/>
+          <a:lstStyle/>
+          <a:p>
+            <a:r>
+              <a:rPr lang="en-US"/>
               <a:t>© SoftUni – </a:t>
             </a:r>
             <a:r>
-              <a:rPr lang="en-US" u="sng" dirty="0">
+              <a:rPr lang="en-US" u="sng">
                 <a:hlinkClick r:id="rId3"/>
               </a:rPr>
               <a:t>https://softuni.org</a:t>
             </a:r>
             <a:r>
-              <a:rPr lang="en-US" dirty="0"/>
+              <a:rPr lang="en-US"/>
               <a:t>. Copyrighted document. Unauthorized copy or reproduction is not permitted.</a:t>
             </a:r>
+            <a:endParaRPr lang="en-US" dirty="0"/>
           </a:p>
         </p:txBody>
       </p:sp>
     </p:spTree>
     <p:extLst>
       <p:ext uri="{BB962C8B-B14F-4D97-AF65-F5344CB8AC3E}">
-        <p14:creationId xmlns:p14="http://schemas.microsoft.com/office/powerpoint/2010/main" val="846801693"/>
+        <p14:creationId xmlns:p14="http://schemas.microsoft.com/office/powerpoint/2010/main" val="3605149114"/>
       </p:ext>
     </p:extLst>
   </p:cSld>
@@ -1508,6 +1473,275 @@
           <a:bodyPr/>
           <a:lstStyle/>
           <a:p>
+            <a:endParaRPr lang="bg-BG" dirty="0"/>
+          </a:p>
+        </p:txBody>
+      </p:sp>
+      <p:sp>
+        <p:nvSpPr>
+          <p:cNvPr id="4" name="Slide Number Placeholder 3"/>
+          <p:cNvSpPr>
+            <a:spLocks noGrp="1"/>
+          </p:cNvSpPr>
+          <p:nvPr>
+            <p:ph type="sldNum" sz="quarter" idx="10"/>
+          </p:nvPr>
+        </p:nvSpPr>
+        <p:spPr/>
+        <p:txBody>
+          <a:bodyPr/>
+          <a:lstStyle/>
+          <a:p>
+            <a:fld id="{2BF067CD-8E6B-4360-9AA8-C5DF2A48A6D1}" type="slidenum">
+              <a:rPr lang="en-US" smtClean="0"/>
+              <a:t>18</a:t>
+            </a:fld>
+            <a:endParaRPr lang="en-US" dirty="0"/>
+          </a:p>
+        </p:txBody>
+      </p:sp>
+      <p:sp>
+        <p:nvSpPr>
+          <p:cNvPr id="7" name="Footer Placeholder 7">
+            <a:extLst>
+              <a:ext uri="{FF2B5EF4-FFF2-40B4-BE49-F238E27FC236}">
+                <a16:creationId xmlns:a16="http://schemas.microsoft.com/office/drawing/2014/main" id="{C871A23B-5C38-4F54-886A-15CDA6D88DF6}"/>
+              </a:ext>
+            </a:extLst>
+          </p:cNvPr>
+          <p:cNvSpPr>
+            <a:spLocks noGrp="1"/>
+          </p:cNvSpPr>
+          <p:nvPr>
+            <p:ph type="ftr" sz="quarter" idx="4"/>
+          </p:nvPr>
+        </p:nvSpPr>
+        <p:spPr>
+          <a:xfrm>
+            <a:off x="-1" y="8847000"/>
+            <a:ext cx="6488999" cy="297000"/>
+          </a:xfrm>
+          <a:prstGeom prst="rect">
+            <a:avLst/>
+          </a:prstGeom>
+        </p:spPr>
+        <p:txBody>
+          <a:bodyPr vert="horz" lIns="91440" tIns="45720" rIns="91440" bIns="45720" rtlCol="0" anchor="b"/>
+          <a:lstStyle>
+            <a:lvl1pPr algn="l">
+              <a:defRPr sz="1100"/>
+            </a:lvl1pPr>
+          </a:lstStyle>
+          <a:p>
+            <a:r>
+              <a:rPr lang="en-US" dirty="0"/>
+              <a:t>© SoftUni – </a:t>
+            </a:r>
+            <a:r>
+              <a:rPr lang="en-US" u="sng" dirty="0">
+                <a:hlinkClick r:id="rId3"/>
+              </a:rPr>
+              <a:t>https://softuni.org</a:t>
+            </a:r>
+            <a:r>
+              <a:rPr lang="en-US" dirty="0"/>
+              <a:t>. Copyrighted document. Unauthorized copy or reproduction is not permitted.</a:t>
+            </a:r>
+          </a:p>
+        </p:txBody>
+      </p:sp>
+    </p:spTree>
+    <p:extLst>
+      <p:ext uri="{BB962C8B-B14F-4D97-AF65-F5344CB8AC3E}">
+        <p14:creationId xmlns:p14="http://schemas.microsoft.com/office/powerpoint/2010/main" val="503613592"/>
+      </p:ext>
+    </p:extLst>
+  </p:cSld>
+  <p:clrMapOvr>
+    <a:masterClrMapping/>
+  </p:clrMapOvr>
+</p:notes>
+</file>
+
+<file path=ppt/notesSlides/notesSlide7.xml><?xml version="1.0" encoding="utf-8"?>
+<p:notes xmlns:a="http://schemas.openxmlformats.org/drawingml/2006/main" xmlns:r="http://schemas.openxmlformats.org/officeDocument/2006/relationships" xmlns:p="http://schemas.openxmlformats.org/presentationml/2006/main">
+  <p:cSld>
+    <p:spTree>
+      <p:nvGrpSpPr>
+        <p:cNvPr id="1" name=""/>
+        <p:cNvGrpSpPr/>
+        <p:nvPr/>
+      </p:nvGrpSpPr>
+      <p:grpSpPr>
+        <a:xfrm>
+          <a:off x="0" y="0"/>
+          <a:ext cx="0" cy="0"/>
+          <a:chOff x="0" y="0"/>
+          <a:chExt cx="0" cy="0"/>
+        </a:xfrm>
+      </p:grpSpPr>
+      <p:sp>
+        <p:nvSpPr>
+          <p:cNvPr id="2" name="Slide Image Placeholder 1"/>
+          <p:cNvSpPr>
+            <a:spLocks noGrp="1" noRot="1" noChangeAspect="1"/>
+          </p:cNvSpPr>
+          <p:nvPr>
+            <p:ph type="sldImg"/>
+          </p:nvPr>
+        </p:nvSpPr>
+        <p:spPr/>
+      </p:sp>
+      <p:sp>
+        <p:nvSpPr>
+          <p:cNvPr id="3" name="Notes Placeholder 2"/>
+          <p:cNvSpPr>
+            <a:spLocks noGrp="1"/>
+          </p:cNvSpPr>
+          <p:nvPr>
+            <p:ph type="body" idx="1"/>
+          </p:nvPr>
+        </p:nvSpPr>
+        <p:spPr/>
+        <p:txBody>
+          <a:bodyPr/>
+          <a:lstStyle/>
+          <a:p>
+            <a:endParaRPr lang="en-US" dirty="0"/>
+          </a:p>
+        </p:txBody>
+      </p:sp>
+      <p:sp>
+        <p:nvSpPr>
+          <p:cNvPr id="5" name="Slide Number Placeholder 4"/>
+          <p:cNvSpPr>
+            <a:spLocks noGrp="1"/>
+          </p:cNvSpPr>
+          <p:nvPr>
+            <p:ph type="sldNum" sz="quarter" idx="11"/>
+          </p:nvPr>
+        </p:nvSpPr>
+        <p:spPr/>
+        <p:txBody>
+          <a:bodyPr/>
+          <a:lstStyle/>
+          <a:p>
+            <a:fld id="{3EBA5BD7-F043-4D1B-AA17-CD412FC534DE}" type="slidenum">
+              <a:rPr lang="en-US" smtClean="0"/>
+              <a:pPr/>
+              <a:t>25</a:t>
+            </a:fld>
+            <a:endParaRPr lang="en-US" dirty="0"/>
+          </a:p>
+        </p:txBody>
+      </p:sp>
+      <p:sp>
+        <p:nvSpPr>
+          <p:cNvPr id="6" name="Footer Placeholder 7">
+            <a:extLst>
+              <a:ext uri="{FF2B5EF4-FFF2-40B4-BE49-F238E27FC236}">
+                <a16:creationId xmlns:a16="http://schemas.microsoft.com/office/drawing/2014/main" id="{BFF5DFD4-93B8-42D0-AC25-A8E58301E736}"/>
+              </a:ext>
+            </a:extLst>
+          </p:cNvPr>
+          <p:cNvSpPr>
+            <a:spLocks noGrp="1"/>
+          </p:cNvSpPr>
+          <p:nvPr>
+            <p:ph type="ftr" sz="quarter" idx="4"/>
+          </p:nvPr>
+        </p:nvSpPr>
+        <p:spPr>
+          <a:xfrm>
+            <a:off x="-1" y="8847000"/>
+            <a:ext cx="6488999" cy="297000"/>
+          </a:xfrm>
+          <a:prstGeom prst="rect">
+            <a:avLst/>
+          </a:prstGeom>
+        </p:spPr>
+        <p:txBody>
+          <a:bodyPr vert="horz" lIns="91440" tIns="45720" rIns="91440" bIns="45720" rtlCol="0" anchor="b"/>
+          <a:lstStyle>
+            <a:lvl1pPr algn="l">
+              <a:defRPr sz="1100"/>
+            </a:lvl1pPr>
+          </a:lstStyle>
+          <a:p>
+            <a:r>
+              <a:rPr lang="en-US" dirty="0"/>
+              <a:t>© SoftUni – </a:t>
+            </a:r>
+            <a:r>
+              <a:rPr lang="en-US" u="sng" dirty="0">
+                <a:hlinkClick r:id="rId3"/>
+              </a:rPr>
+              <a:t>https://softuni.org</a:t>
+            </a:r>
+            <a:r>
+              <a:rPr lang="en-US" dirty="0"/>
+              <a:t>. Copyrighted document. Unauthorized copy or reproduction is not permitted.</a:t>
+            </a:r>
+          </a:p>
+        </p:txBody>
+      </p:sp>
+    </p:spTree>
+    <p:extLst>
+      <p:ext uri="{BB962C8B-B14F-4D97-AF65-F5344CB8AC3E}">
+        <p14:creationId xmlns:p14="http://schemas.microsoft.com/office/powerpoint/2010/main" val="846801693"/>
+      </p:ext>
+    </p:extLst>
+  </p:cSld>
+  <p:clrMapOvr>
+    <a:masterClrMapping/>
+  </p:clrMapOvr>
+</p:notes>
+</file>
+
+<file path=ppt/notesSlides/notesSlide8.xml><?xml version="1.0" encoding="utf-8"?>
+<p:notes xmlns:a="http://schemas.openxmlformats.org/drawingml/2006/main" xmlns:r="http://schemas.openxmlformats.org/officeDocument/2006/relationships" xmlns:p="http://schemas.openxmlformats.org/presentationml/2006/main">
+  <p:cSld>
+    <p:spTree>
+      <p:nvGrpSpPr>
+        <p:cNvPr id="1" name=""/>
+        <p:cNvGrpSpPr/>
+        <p:nvPr/>
+      </p:nvGrpSpPr>
+      <p:grpSpPr>
+        <a:xfrm>
+          <a:off x="0" y="0"/>
+          <a:ext cx="0" cy="0"/>
+          <a:chOff x="0" y="0"/>
+          <a:chExt cx="0" cy="0"/>
+        </a:xfrm>
+      </p:grpSpPr>
+      <p:sp>
+        <p:nvSpPr>
+          <p:cNvPr id="2" name="Slide Image Placeholder 1"/>
+          <p:cNvSpPr>
+            <a:spLocks noGrp="1" noRot="1" noChangeAspect="1"/>
+          </p:cNvSpPr>
+          <p:nvPr>
+            <p:ph type="sldImg"/>
+          </p:nvPr>
+        </p:nvSpPr>
+        <p:spPr/>
+      </p:sp>
+      <p:sp>
+        <p:nvSpPr>
+          <p:cNvPr id="3" name="Notes Placeholder 2"/>
+          <p:cNvSpPr>
+            <a:spLocks noGrp="1"/>
+          </p:cNvSpPr>
+          <p:nvPr>
+            <p:ph type="body" idx="1"/>
+          </p:nvPr>
+        </p:nvSpPr>
+        <p:spPr/>
+        <p:txBody>
+          <a:bodyPr/>
+          <a:lstStyle/>
+          <a:p>
             <a:endParaRPr lang="en-US" dirty="0"/>
           </a:p>
         </p:txBody>
@@ -1705,7 +1939,7 @@
 </p:notes>
 </file>
 
-<file path=ppt/notesSlides/notesSlide7.xml><?xml version="1.0" encoding="utf-8"?>
+<file path=ppt/notesSlides/notesSlide9.xml><?xml version="1.0" encoding="utf-8"?>
 <p:notes xmlns:a="http://schemas.openxmlformats.org/drawingml/2006/main" xmlns:r="http://schemas.openxmlformats.org/officeDocument/2006/relationships" xmlns:p="http://schemas.openxmlformats.org/presentationml/2006/main">
   <p:cSld>
     <p:spTree>
@@ -8445,7 +8679,12 @@
             <p:ph type="subTitle" idx="1"/>
           </p:nvPr>
         </p:nvSpPr>
-        <p:spPr/>
+        <p:spPr>
+          <a:xfrm>
+            <a:off x="554182" y="1408774"/>
+            <a:ext cx="11083636" cy="747890"/>
+          </a:xfrm>
+        </p:spPr>
         <p:txBody>
           <a:bodyPr>
             <a:normAutofit/>
@@ -8457,20 +8696,7 @@
                 <a:latin typeface="Calibri" panose="020F0502020204030204" pitchFamily="34" charset="0"/>
                 <a:cs typeface="Calibri" panose="020F0502020204030204" pitchFamily="34" charset="0"/>
               </a:rPr>
-              <a:t>Обработка на последователности</a:t>
-            </a:r>
-            <a:br>
-              <a:rPr lang="bg" sz="3550" dirty="0">
-                <a:latin typeface="Calibri" panose="020F0502020204030204" pitchFamily="34" charset="0"/>
-                <a:cs typeface="Calibri" panose="020F0502020204030204" pitchFamily="34" charset="0"/>
-              </a:rPr>
-            </a:br>
-            <a:r>
-              <a:rPr lang="bg" sz="3550" dirty="0">
-                <a:latin typeface="Calibri" panose="020F0502020204030204" pitchFamily="34" charset="0"/>
-                <a:cs typeface="Calibri" panose="020F0502020204030204" pitchFamily="34" charset="0"/>
-              </a:rPr>
-              <a:t>от елементи с променлива дължина</a:t>
+              <a:t>Същност, методи за обработка, четене и отпечатване</a:t>
             </a:r>
           </a:p>
         </p:txBody>
@@ -9402,6 +9628,80 @@
       </p:grpSpPr>
       <p:sp>
         <p:nvSpPr>
+          <p:cNvPr id="4" name="Subtitle 3">
+            <a:extLst>
+              <a:ext uri="{FF2B5EF4-FFF2-40B4-BE49-F238E27FC236}">
+                <a16:creationId xmlns:a16="http://schemas.microsoft.com/office/drawing/2014/main" id="{808EF176-F273-21D4-B13E-BF19F27B3D36}"/>
+              </a:ext>
+            </a:extLst>
+          </p:cNvPr>
+          <p:cNvSpPr>
+            <a:spLocks noGrp="1"/>
+          </p:cNvSpPr>
+          <p:nvPr>
+            <p:ph type="subTitle" sz="quarter" idx="11"/>
+          </p:nvPr>
+        </p:nvSpPr>
+        <p:spPr/>
+        <p:txBody>
+          <a:bodyPr/>
+          <a:lstStyle/>
+          <a:p>
+            <a:r>
+              <a:rPr lang="en-GB" sz="4000" dirty="0">
+                <a:latin typeface="Consolas" panose="020B0609020204030204" pitchFamily="49" charset="0"/>
+                <a:cs typeface="Consolas" panose="020B0609020204030204" pitchFamily="49" charset="0"/>
+              </a:rPr>
+              <a:t>For</a:t>
+            </a:r>
+            <a:r>
+              <a:rPr lang="en-GB" sz="4000" dirty="0">
+                <a:cs typeface="Arial"/>
+              </a:rPr>
+              <a:t>-цикъл</a:t>
+            </a:r>
+            <a:r>
+              <a:rPr lang="bg-BG" sz="4000" dirty="0">
+                <a:cs typeface="Arial"/>
+              </a:rPr>
+              <a:t>,</a:t>
+            </a:r>
+            <a:r>
+              <a:rPr lang="en-GB" sz="4000" dirty="0">
+                <a:cs typeface="Arial"/>
+              </a:rPr>
+              <a:t> </a:t>
+            </a:r>
+            <a:r>
+              <a:rPr lang="en-GB" sz="4000" dirty="0">
+                <a:latin typeface="Consolas" panose="020B0609020204030204" pitchFamily="49" charset="0"/>
+                <a:cs typeface="Consolas" panose="020B0609020204030204" pitchFamily="49" charset="0"/>
+              </a:rPr>
+              <a:t>String.Split()</a:t>
+            </a:r>
+            <a:r>
+              <a:rPr lang="bg-BG" sz="4000" dirty="0">
+                <a:latin typeface="Calibri" panose="020F0502020204030204" pitchFamily="34" charset="0"/>
+                <a:cs typeface="Calibri" panose="020F0502020204030204" pitchFamily="34" charset="0"/>
+              </a:rPr>
+              <a:t>, </a:t>
+            </a:r>
+            <a:r>
+              <a:rPr lang="en-US" sz="4000" dirty="0">
+                <a:latin typeface="Consolas" panose="020B0609020204030204" pitchFamily="49" charset="0"/>
+                <a:cs typeface="Consolas" panose="020B0609020204030204" pitchFamily="49" charset="0"/>
+              </a:rPr>
+              <a:t>String.Join()</a:t>
+            </a:r>
+            <a:endParaRPr lang="en-BG" dirty="0">
+              <a:latin typeface="Consolas" panose="020B0609020204030204" pitchFamily="49" charset="0"/>
+              <a:cs typeface="Consolas" panose="020B0609020204030204" pitchFamily="49" charset="0"/>
+            </a:endParaRPr>
+          </a:p>
+        </p:txBody>
+      </p:sp>
+      <p:sp>
+        <p:nvSpPr>
           <p:cNvPr id="2" name="Заглавие 1">
             <a:extLst>
               <a:ext uri="{FF2B5EF4-FFF2-40B4-BE49-F238E27FC236}">
@@ -9418,8 +9718,8 @@
         </p:nvSpPr>
         <p:spPr>
           <a:xfrm>
-            <a:off x="353528" y="4716198"/>
-            <a:ext cx="11484945" cy="768084"/>
+            <a:off x="615109" y="4704825"/>
+            <a:ext cx="10961783" cy="768084"/>
           </a:xfrm>
         </p:spPr>
         <p:txBody>
@@ -9427,14 +9727,9 @@
           <a:lstStyle/>
           <a:p>
             <a:r>
-              <a:rPr lang="en-GB" sz="5350" dirty="0">
-                <a:cs typeface="Arial"/>
-              </a:rPr>
-              <a:t>Използване на цикъл или String.Split()</a:t>
-            </a:r>
-            <a:endParaRPr lang="bg-BG" sz="5350" dirty="0">
-              <a:cs typeface="Arial"/>
-            </a:endParaRPr>
+              <a:rPr lang="bg-BG" dirty="0"/>
+              <a:t>Четене и отпечатване на списък</a:t>
+            </a:r>
           </a:p>
         </p:txBody>
       </p:sp>
@@ -9524,7 +9819,7 @@
         </p:nvSpPr>
         <p:spPr>
           <a:xfrm>
-            <a:off x="190402" y="1196125"/>
+            <a:off x="190402" y="1134000"/>
             <a:ext cx="12091051" cy="5528766"/>
           </a:xfrm>
         </p:spPr>
@@ -9588,37 +9883,96 @@
             </a:endParaRPr>
           </a:p>
           <a:p>
-            <a:pPr marL="360045" indent="-360045"/>
+            <a:pPr marL="360045" indent="-360045">
+              <a:spcBef>
+                <a:spcPts val="200"/>
+              </a:spcBef>
+            </a:pPr>
             <a:r>
               <a:rPr lang="en-US" sz="3600" dirty="0"/>
               <a:t>След това създаваме списък с дължина </a:t>
             </a:r>
             <a:r>
+              <a:rPr lang="en-US" sz="3600" b="1" dirty="0">
+                <a:solidFill>
+                  <a:schemeClr val="bg1"/>
+                </a:solidFill>
+              </a:rPr>
+              <a:t>n</a:t>
+            </a:r>
+            <a:r>
+              <a:rPr lang="bg-BG" sz="3600" dirty="0"/>
+              <a:t>,</a:t>
+            </a:r>
+            <a:r>
+              <a:rPr lang="en-US" sz="3600" dirty="0"/>
+              <a:t> </a:t>
+            </a:r>
+            <a:r>
+              <a:rPr lang="en-US" sz="3600" b="1" dirty="0">
+                <a:solidFill>
+                  <a:schemeClr val="bg1"/>
+                </a:solidFill>
+              </a:rPr>
+              <a:t>четем</a:t>
+            </a:r>
+            <a:r>
+              <a:rPr lang="en-US" sz="3600" dirty="0"/>
+              <a:t> </a:t>
+            </a:r>
+            <a:r>
+              <a:rPr lang="en-US" sz="3600" b="1" dirty="0">
+                <a:solidFill>
+                  <a:schemeClr val="bg1"/>
+                </a:solidFill>
+              </a:rPr>
+              <a:t>елементите</a:t>
+            </a:r>
+            <a:r>
+              <a:rPr lang="bg-BG" sz="3600" dirty="0">
+                <a:ea typeface="+mn-lt"/>
+                <a:cs typeface="+mn-lt"/>
+              </a:rPr>
+              <a:t> с </a:t>
+            </a:r>
+            <a:r>
               <a:rPr lang="en-US" sz="3600" dirty="0">
-                <a:solidFill>
-                  <a:schemeClr val="bg1"/>
-                </a:solidFill>
-              </a:rPr>
-              <a:t>n</a:t>
-            </a:r>
-            <a:r>
-              <a:rPr lang="en-US" sz="3600" dirty="0"/>
-              <a:t> и четем </a:t>
-            </a:r>
-            <a:r>
-              <a:rPr lang="en-US" sz="3600" dirty="0">
-                <a:solidFill>
-                  <a:schemeClr val="bg1"/>
-                </a:solidFill>
-              </a:rPr>
-              <a:t>елементите</a:t>
+                <a:latin typeface="Consolas" panose="020B0609020204030204" pitchFamily="49" charset="0"/>
+                <a:ea typeface="+mn-lt"/>
+                <a:cs typeface="Consolas" panose="020B0609020204030204" pitchFamily="49" charset="0"/>
+              </a:rPr>
+              <a:t>for</a:t>
             </a:r>
             <a:r>
               <a:rPr lang="en-US" sz="3600" dirty="0">
                 <a:ea typeface="+mn-lt"/>
                 <a:cs typeface="+mn-lt"/>
               </a:rPr>
-              <a:t>:</a:t>
+              <a:t>-</a:t>
+            </a:r>
+            <a:r>
+              <a:rPr lang="bg-BG" sz="3600" dirty="0">
+                <a:ea typeface="+mn-lt"/>
+                <a:cs typeface="+mn-lt"/>
+              </a:rPr>
+              <a:t>цикъл и ги </a:t>
+            </a:r>
+            <a:r>
+              <a:rPr lang="bg-BG" sz="3600" b="1" dirty="0">
+                <a:solidFill>
+                  <a:schemeClr val="bg1"/>
+                </a:solidFill>
+                <a:ea typeface="+mn-lt"/>
+                <a:cs typeface="+mn-lt"/>
+              </a:rPr>
+              <a:t>добавяме </a:t>
+            </a:r>
+            <a:r>
+              <a:rPr lang="bg-BG" sz="3600" dirty="0">
+                <a:ea typeface="+mn-lt"/>
+                <a:cs typeface="+mn-lt"/>
+              </a:rPr>
+              <a:t>към списъка:</a:t>
             </a:r>
             <a:br>
               <a:rPr lang="en-US" sz="3600" dirty="0"/>
@@ -9671,7 +10025,7 @@
         </p:nvSpPr>
         <p:spPr>
           <a:xfrm>
-            <a:off x="695401" y="1902823"/>
+            <a:off x="695401" y="1764000"/>
             <a:ext cx="7378287" cy="618162"/>
           </a:xfrm>
           <a:prstGeom prst="rect">
@@ -10121,13 +10475,47 @@
             <a:r>
               <a:rPr lang="en-US" sz="2600" dirty="0">
                 <a:solidFill>
-                  <a:schemeClr val="accent2">
-                    <a:lumMod val="75000"/>
-                  </a:schemeClr>
+                  <a:schemeClr val="accent2"/>
                 </a:solidFill>
                 <a:latin typeface="Consolas"/>
               </a:rPr>
-              <a:t>// Списъкът се състои от: {10, 20, 30, 40, 50}</a:t>
+              <a:t>/</a:t>
+            </a:r>
+            <a:r>
+              <a:rPr lang="bg-BG" sz="2600" dirty="0">
+                <a:solidFill>
+                  <a:schemeClr val="accent2"/>
+                </a:solidFill>
+                <a:latin typeface="Consolas"/>
+              </a:rPr>
+              <a:t>/</a:t>
+            </a:r>
+            <a:r>
+              <a:rPr lang="en-US" sz="2600" dirty="0">
+                <a:solidFill>
+                  <a:schemeClr val="accent2"/>
+                </a:solidFill>
+                <a:latin typeface="Consolas"/>
+              </a:rPr>
+              <a:t> </a:t>
+            </a:r>
+            <a:r>
+              <a:rPr lang="bg-BG" sz="2600" i="1" dirty="0">
+                <a:solidFill>
+                  <a:schemeClr val="accent2"/>
+                </a:solidFill>
+                <a:latin typeface="Consolas"/>
+              </a:rPr>
+              <a:t>Списъкът </a:t>
+            </a:r>
+            <a:r>
+              <a:rPr lang="en-US" sz="2600" i="1" dirty="0">
+                <a:solidFill>
+                  <a:schemeClr val="accent2"/>
+                </a:solidFill>
+                <a:latin typeface="Consolas"/>
+              </a:rPr>
+              <a:t>list: {10, 20, 30, 40, 50}</a:t>
             </a:r>
           </a:p>
         </p:txBody>
@@ -10781,14 +11169,14 @@
           <a:p>
             <a:pPr marL="360045" indent="-360045"/>
             <a:r>
-              <a:rPr lang="en-US" sz="3350" dirty="0">
+              <a:rPr lang="bg-BG" sz="3350" dirty="0">
                 <a:ea typeface="+mn-lt"/>
                 <a:cs typeface="+mn-lt"/>
               </a:rPr>
               <a:t>Списъкът може да бъде прочетен от </a:t>
             </a:r>
             <a:r>
-              <a:rPr lang="en-US" sz="3350" dirty="0">
+              <a:rPr lang="bg-BG" sz="3350" b="1" dirty="0">
                 <a:solidFill>
                   <a:schemeClr val="bg1"/>
                 </a:solidFill>
@@ -10798,30 +11186,44 @@
               <a:t>един ред</a:t>
             </a:r>
             <a:r>
-              <a:rPr lang="en-US" sz="3350" dirty="0">
+              <a:rPr lang="bg-BG" sz="3350" dirty="0">
                 <a:ea typeface="+mn-lt"/>
                 <a:cs typeface="+mn-lt"/>
               </a:rPr>
-              <a:t> като </a:t>
-            </a:r>
-            <a:r>
-              <a:rPr lang="en-US" sz="3350" dirty="0">
-                <a:solidFill>
-                  <a:schemeClr val="bg1"/>
-                </a:solidFill>
+              <a:t>,</a:t>
+            </a:r>
+            <a:r>
+              <a:rPr lang="bg-BG" sz="3350" b="1" dirty="0">
                 <a:ea typeface="+mn-lt"/>
                 <a:cs typeface="+mn-lt"/>
               </a:rPr>
-              <a:t>стойностите се разделят с интервал</a:t>
-            </a:r>
-            <a:r>
-              <a:rPr lang="en-US" sz="3350" dirty="0">
+              <a:t> </a:t>
+            </a:r>
+            <a:r>
+              <a:rPr lang="bg-BG" sz="3350" dirty="0">
                 <a:ea typeface="+mn-lt"/>
                 <a:cs typeface="+mn-lt"/>
               </a:rPr>
+              <a:t>като стойностите се </a:t>
+            </a:r>
+            <a:r>
+              <a:rPr lang="bg-BG" sz="3350" b="1" dirty="0">
+                <a:solidFill>
+                  <a:schemeClr val="bg1"/>
+                </a:solidFill>
+                <a:ea typeface="+mn-lt"/>
+                <a:cs typeface="+mn-lt"/>
+              </a:rPr>
+              <a:t>разделят с интервал</a:t>
+            </a:r>
+            <a:r>
+              <a:rPr lang="bg-BG" sz="3350" dirty="0">
+                <a:ea typeface="+mn-lt"/>
+                <a:cs typeface="+mn-lt"/>
+              </a:rPr>
               <a:t>:</a:t>
             </a:r>
-            <a:endParaRPr lang="en-US" sz="3350" dirty="0"/>
+            <a:endParaRPr lang="bg-BG" sz="3350" dirty="0"/>
           </a:p>
         </p:txBody>
       </p:sp>
@@ -10847,7 +11249,7 @@
                 <a:ea typeface="+mj-lt"/>
                 <a:cs typeface="+mj-lt"/>
               </a:rPr>
-              <a:t>Четене на стойностите на списък от един ред</a:t>
+              <a:t>Четене на списък от един ред</a:t>
             </a:r>
             <a:endParaRPr lang="bg-BG" sz="3800" dirty="0">
               <a:cs typeface="Calibri"/>
@@ -11121,7 +11523,7 @@
           <a:p>
             <a:pPr algn="ctr"/>
             <a:r>
-              <a:rPr lang="en-US" sz="2350" b="1" noProof="1">
+              <a:rPr lang="en-US" sz="2400" b="1" noProof="1">
                 <a:solidFill>
                   <a:srgbClr val="FFFFFF"/>
                 </a:solidFill>
@@ -11129,7 +11531,7 @@
               <a:t>Превръщане на колекцията</a:t>
             </a:r>
             <a:r>
-              <a:rPr lang="en-US" sz="2350" b="1" noProof="1">
+              <a:rPr lang="en-US" sz="2400" b="1" noProof="1">
                 <a:solidFill>
                   <a:srgbClr val="FFFFFF"/>
                 </a:solidFill>
@@ -11139,14 +11541,15 @@
               <a:t> в </a:t>
             </a:r>
             <a:r>
-              <a:rPr lang="en-US" sz="2350" b="1" noProof="1">
+              <a:rPr lang="en-US" sz="2400" b="1" noProof="1">
                 <a:solidFill>
                   <a:schemeClr val="bg1">
                     <a:lumMod val="60000"/>
                     <a:lumOff val="40000"/>
                   </a:schemeClr>
                 </a:solidFill>
-                <a:latin typeface="Consolas"/>
+                <a:latin typeface="Calibri" panose="020F0502020204030204" pitchFamily="34" charset="0"/>
+                <a:cs typeface="Calibri" panose="020F0502020204030204" pitchFamily="34" charset="0"/>
               </a:rPr>
               <a:t>списък</a:t>
             </a:r>
@@ -11347,7 +11750,7 @@
           <a:p>
             <a:pPr algn="ctr"/>
             <a:r>
-              <a:rPr lang="en-US" sz="2350" b="1" noProof="1">
+              <a:rPr lang="en-US" sz="2400" b="1" noProof="1">
                 <a:solidFill>
                   <a:srgbClr val="FFFFFF"/>
                 </a:solidFill>
@@ -11355,7 +11758,7 @@
               <a:t>Четене на</a:t>
             </a:r>
             <a:r>
-              <a:rPr lang="en-US" sz="2350" b="1" noProof="1">
+              <a:rPr lang="en-US" sz="2400" b="1" noProof="1">
                 <a:solidFill>
                   <a:srgbClr val="FFFFFF"/>
                 </a:solidFill>
@@ -11365,26 +11768,27 @@
               <a:t> </a:t>
             </a:r>
             <a:r>
-              <a:rPr lang="en-US" sz="2350" b="1" noProof="1">
+              <a:rPr lang="en-US" sz="2400" b="1" noProof="1">
                 <a:solidFill>
                   <a:schemeClr val="bg1">
                     <a:lumMod val="60000"/>
                     <a:lumOff val="40000"/>
                   </a:schemeClr>
                 </a:solidFill>
-                <a:latin typeface="Consolas"/>
+                <a:latin typeface="Calibri" panose="020F0502020204030204" pitchFamily="34" charset="0"/>
+                <a:cs typeface="Calibri" panose="020F0502020204030204" pitchFamily="34" charset="0"/>
               </a:rPr>
               <a:t>списък</a:t>
             </a:r>
             <a:r>
-              <a:rPr lang="en-US" sz="2350" b="1" noProof="1">
+              <a:rPr lang="en-US" sz="2400" b="1" noProof="1">
                 <a:solidFill>
                   <a:srgbClr val="FFFFFF"/>
                 </a:solidFill>
               </a:rPr>
               <a:t> от числа</a:t>
             </a:r>
-            <a:endParaRPr lang="en-US" sz="2350" b="1" noProof="1">
+            <a:endParaRPr lang="en-US" sz="2400" b="1" noProof="1">
               <a:solidFill>
                 <a:schemeClr val="bg1"/>
               </a:solidFill>
@@ -11917,8 +12321,12 @@
           <a:p>
             <a:pPr marL="360045" indent="-360045"/>
             <a:r>
+              <a:rPr lang="bg-BG" sz="3600" dirty="0"/>
+              <a:t>Отпечатване</a:t>
+            </a:r>
+            <a:r>
               <a:rPr lang="en-US" sz="3350" dirty="0"/>
-              <a:t>Принтиране на списък чрез</a:t>
+              <a:t> на списък чрез</a:t>
             </a:r>
             <a:r>
               <a:rPr lang="en-US" sz="3350" dirty="0">
@@ -11940,8 +12348,16 @@
               <a:t>for</a:t>
             </a:r>
             <a:r>
+              <a:rPr lang="en-US" sz="3350" b="1" dirty="0">
+                <a:solidFill>
+                  <a:schemeClr val="bg1"/>
+                </a:solidFill>
+              </a:rPr>
+              <a:t>-цикъл</a:t>
+            </a:r>
+            <a:r>
               <a:rPr lang="en-US" sz="3350" dirty="0"/>
-              <a:t>-цикъл:</a:t>
+              <a:t>:</a:t>
             </a:r>
             <a:endParaRPr lang="bg-BG" sz="3350" dirty="0"/>
           </a:p>
@@ -11966,8 +12382,8 @@
           <a:p>
             <a:pPr marL="360045" indent="-360045"/>
             <a:r>
-              <a:rPr lang="en-US" sz="3350" dirty="0"/>
-              <a:t>Принтиране</a:t>
+              <a:rPr lang="bg-BG" sz="3600" dirty="0"/>
+              <a:t>Отпечатване</a:t>
             </a:r>
             <a:r>
               <a:rPr lang="en-US" sz="3350" dirty="0">
@@ -12011,8 +12427,12 @@
           <a:lstStyle/>
           <a:p>
             <a:r>
+              <a:rPr lang="bg-BG" sz="3950" dirty="0"/>
+              <a:t>Отпечатване</a:t>
+            </a:r>
+            <a:r>
               <a:rPr lang="en-US" sz="3950" dirty="0"/>
-              <a:t>Принтиране на списъка на конзолата</a:t>
+              <a:t> на списъка на конзолата</a:t>
             </a:r>
             <a:endParaRPr lang="bg-BG" dirty="0"/>
           </a:p>
@@ -12076,7 +12496,7 @@
                 <a:latin typeface="Consolas" panose="020B0609020204030204" pitchFamily="49" charset="0"/>
                 <a:cs typeface="Arial" panose="020B0604020202020204" pitchFamily="34" charset="0"/>
               </a:rPr>
-              <a:t>  "one", "two", "three", "four", "five", "six"};</a:t>
+              <a:t>  "one", "two", "three", "four", "five" }</a:t>
             </a:r>
           </a:p>
           <a:p>
@@ -12201,7 +12621,7 @@
                 <a:latin typeface="Consolas"/>
                 <a:cs typeface="Arial"/>
               </a:rPr>
-              <a:t>  "one", "two", "three", "four", "five", "six"};</a:t>
+              <a:t>  "one", "two", "three", "four", "five" };</a:t>
             </a:r>
           </a:p>
           <a:p>
@@ -12261,14 +12681,22 @@
             <a:r>
               <a:rPr lang="en-US" sz="2550" b="1" noProof="1">
                 <a:solidFill>
-                  <a:schemeClr val="accent2">
-                    <a:lumMod val="75000"/>
-                  </a:schemeClr>
+                  <a:schemeClr val="accent2"/>
                 </a:solidFill>
                 <a:latin typeface="Consolas"/>
                 <a:cs typeface="Arial"/>
               </a:rPr>
-              <a:t>// Изход: one; two; three; four; five; six</a:t>
+              <a:t>// </a:t>
+            </a:r>
+            <a:r>
+              <a:rPr lang="en-US" sz="2550" b="1" i="1" noProof="1">
+                <a:solidFill>
+                  <a:schemeClr val="accent2"/>
+                </a:solidFill>
+                <a:latin typeface="Consolas"/>
+                <a:cs typeface="Arial"/>
+              </a:rPr>
+              <a:t>Изход: one; two; three; four; five; six</a:t>
             </a:r>
           </a:p>
         </p:txBody>
@@ -12287,20 +12715,26 @@
           </p:cNvPicPr>
           <p:nvPr/>
         </p:nvPicPr>
-        <p:blipFill>
+        <p:blipFill rotWithShape="1">
           <a:blip r:embed="rId2"/>
-          <a:stretch>
-            <a:fillRect/>
-          </a:stretch>
+          <a:srcRect b="13986"/>
+          <a:stretch/>
         </p:blipFill>
         <p:spPr>
           <a:xfrm>
-            <a:off x="8608210" y="260649"/>
-            <a:ext cx="2866278" cy="2113999"/>
+            <a:off x="8630322" y="1189998"/>
+            <a:ext cx="2866278" cy="1818351"/>
           </a:xfrm>
           <a:prstGeom prst="rect">
             <a:avLst/>
           </a:prstGeom>
+          <a:ln>
+            <a:solidFill>
+              <a:schemeClr val="bg2">
+                <a:lumMod val="75000"/>
+              </a:schemeClr>
+            </a:solidFill>
+          </a:ln>
         </p:spPr>
       </p:pic>
       <p:sp>
@@ -12877,7 +13311,7 @@
                 <a:ea typeface="+mn-lt"/>
                 <a:cs typeface="+mn-lt"/>
               </a:rPr>
-              <a:t>в следният ред</a:t>
+              <a:t>в следния ред</a:t>
             </a:r>
             <a:r>
               <a:rPr lang="en-US" sz="3350" dirty="0"/>
@@ -13797,7 +14231,21 @@
                 <a:ea typeface="+mn-lt"/>
                 <a:cs typeface="+mn-lt"/>
               </a:rPr>
-              <a:t>Тествайте решението в Judge</a:t>
+              <a:t>Тествайте решението </a:t>
+            </a:r>
+            <a:r>
+              <a:rPr lang="bg-BG" sz="1950" dirty="0">
+                <a:ea typeface="+mn-lt"/>
+                <a:cs typeface="+mn-lt"/>
+              </a:rPr>
+              <a:t>си </a:t>
+            </a:r>
+            <a:r>
+              <a:rPr lang="en-US" sz="1950" dirty="0">
+                <a:ea typeface="+mn-lt"/>
+                <a:cs typeface="+mn-lt"/>
+              </a:rPr>
+              <a:t>в Judge</a:t>
             </a:r>
             <a:r>
               <a:rPr lang="en-US" sz="1950" dirty="0"/>
@@ -13809,7 +14257,7 @@
             </a:r>
             <a:r>
               <a:rPr lang="en-US" sz="1950" dirty="0">
-                <a:hlinkClick r:id="rId2"/>
+                <a:hlinkClick r:id="rId3"/>
               </a:rPr>
               <a:t>https://judge.softuni.org/Contests/Practice/Index/4150#0</a:t>
             </a:r>
@@ -14598,7 +15046,19 @@
                   <a:schemeClr val="bg1"/>
                 </a:solidFill>
               </a:rPr>
-              <a:t>изходен списък, </a:t>
+              <a:t>изходен списък</a:t>
+            </a:r>
+            <a:r>
+              <a:rPr lang="en-US" sz="3350" dirty="0"/>
+              <a:t>,</a:t>
+            </a:r>
+            <a:r>
+              <a:rPr lang="en-US" sz="3350" b="1" dirty="0">
+                <a:solidFill>
+                  <a:schemeClr val="bg1"/>
+                </a:solidFill>
+              </a:rPr>
+              <a:t> </a:t>
             </a:r>
             <a:r>
               <a:rPr lang="en-US" sz="3350" dirty="0"/>
@@ -14609,7 +15069,7 @@
                 <a:ea typeface="+mn-lt"/>
                 <a:cs typeface="+mn-lt"/>
               </a:rPr>
-              <a:t>да съдържа всички цифри от двата списъка.</a:t>
+              <a:t>да съдържа всички цифри от двата списъка</a:t>
             </a:r>
             <a:endParaRPr lang="bg-BG" sz="3350" dirty="0"/>
           </a:p>
@@ -14628,13 +15088,13 @@
                 </a:solidFill>
                 <a:cs typeface="Calibri"/>
               </a:rPr>
-              <a:t>дължините на двата списъка</a:t>
+              <a:t>дължините </a:t>
             </a:r>
             <a:r>
               <a:rPr lang="en-US" sz="3150" dirty="0">
                 <a:cs typeface="Calibri"/>
               </a:rPr>
-              <a:t> </a:t>
+              <a:t>на двата списъка </a:t>
             </a:r>
             <a:r>
               <a:rPr lang="en-US" sz="3150" b="1" dirty="0">
@@ -14649,9 +15109,22 @@
               <a:rPr lang="en-US" sz="3150" dirty="0">
                 <a:cs typeface="Calibri"/>
               </a:rPr>
-              <a:t> просто добавете оставащите елементи в края на списъка</a:t>
-            </a:r>
-            <a:endParaRPr lang="en-US" sz="3150" dirty="0"/>
+              <a:t>, просто добавете оставащите елементи в </a:t>
+            </a:r>
+            <a:r>
+              <a:rPr lang="en-US" sz="3150" b="1" dirty="0">
+                <a:solidFill>
+                  <a:schemeClr val="bg1"/>
+                </a:solidFill>
+                <a:cs typeface="Calibri"/>
+              </a:rPr>
+              <a:t>края на списъка</a:t>
+            </a:r>
+            <a:endParaRPr lang="en-US" sz="3150" b="1" dirty="0">
+              <a:solidFill>
+                <a:schemeClr val="bg1"/>
+              </a:solidFill>
+            </a:endParaRPr>
           </a:p>
           <a:p>
             <a:pPr lvl="1" indent="-360045"/>
@@ -14898,7 +15371,7 @@
         </p:blipFill>
         <p:spPr>
           <a:xfrm>
-            <a:off x="8467173" y="3424659"/>
+            <a:off x="8886000" y="3677317"/>
             <a:ext cx="2201348" cy="2738766"/>
           </a:xfrm>
           <a:prstGeom prst="rect">
@@ -15242,7 +15715,7 @@
                 <a:ea typeface="+mj-lt"/>
                 <a:cs typeface="+mj-lt"/>
               </a:rPr>
-              <a:t>Обединяване на списъци</a:t>
+              <a:t>Обединяване на списъци (1)</a:t>
             </a:r>
             <a:endParaRPr lang="bg-BG" dirty="0"/>
           </a:p>
@@ -15466,22 +15939,91 @@
                 </a:solidFill>
                 <a:latin typeface="Consolas"/>
               </a:rPr>
-              <a:t>// TODO: </a:t>
+              <a:t>// </a:t>
             </a:r>
             <a:r>
               <a:rPr lang="en-GB" sz="2600" i="1" noProof="1">
                 <a:solidFill>
                   <a:srgbClr val="00B050"/>
                 </a:solidFill>
-                <a:latin typeface="Consolas"/>
-              </a:rPr>
-              <a:t>Да се направи вход</a:t>
+                <a:latin typeface="Calibri" panose="020F0502020204030204" pitchFamily="34" charset="0"/>
+                <a:cs typeface="Calibri" panose="020F0502020204030204" pitchFamily="34" charset="0"/>
+              </a:rPr>
+              <a:t>TODO:</a:t>
+            </a:r>
+            <a:r>
+              <a:rPr lang="en-GB" sz="2600" noProof="1">
+                <a:solidFill>
+                  <a:srgbClr val="00B050"/>
+                </a:solidFill>
+                <a:latin typeface="Calibri" panose="020F0502020204030204" pitchFamily="34" charset="0"/>
+                <a:cs typeface="Calibri" panose="020F0502020204030204" pitchFamily="34" charset="0"/>
+              </a:rPr>
+              <a:t> </a:t>
+            </a:r>
+            <a:r>
+              <a:rPr lang="en-GB" sz="2600" i="1" noProof="1">
+                <a:solidFill>
+                  <a:srgbClr val="00B050"/>
+                </a:solidFill>
+                <a:latin typeface="Calibri" panose="020F0502020204030204" pitchFamily="34" charset="0"/>
+                <a:cs typeface="Calibri" panose="020F0502020204030204" pitchFamily="34" charset="0"/>
+              </a:rPr>
+              <a:t>Да се </a:t>
+            </a:r>
+            <a:r>
+              <a:rPr lang="bg-BG" sz="2600" i="1" noProof="1">
+                <a:solidFill>
+                  <a:srgbClr val="00B050"/>
+                </a:solidFill>
+                <a:latin typeface="Calibri" panose="020F0502020204030204" pitchFamily="34" charset="0"/>
+                <a:cs typeface="Calibri" panose="020F0502020204030204" pitchFamily="34" charset="0"/>
+              </a:rPr>
+              <a:t>прочетат двата списъка – </a:t>
+            </a:r>
+            <a:r>
+              <a:rPr lang="en-US" sz="2600" i="1" noProof="1">
+                <a:solidFill>
+                  <a:srgbClr val="00B050"/>
+                </a:solidFill>
+                <a:cs typeface="Consolas" panose="020B0609020204030204" pitchFamily="49" charset="0"/>
+              </a:rPr>
+              <a:t>nums1</a:t>
+            </a:r>
+            <a:r>
+              <a:rPr lang="en-US" sz="2600" i="1" noProof="1">
+                <a:solidFill>
+                  <a:srgbClr val="00B050"/>
+                </a:solidFill>
+                <a:latin typeface="Calibri" panose="020F0502020204030204" pitchFamily="34" charset="0"/>
+                <a:cs typeface="Calibri" panose="020F0502020204030204" pitchFamily="34" charset="0"/>
+              </a:rPr>
+              <a:t> </a:t>
+            </a:r>
+            <a:r>
+              <a:rPr lang="bg-BG" sz="2600" i="1" noProof="1">
+                <a:solidFill>
+                  <a:srgbClr val="00B050"/>
+                </a:solidFill>
+                <a:latin typeface="Calibri" panose="020F0502020204030204" pitchFamily="34" charset="0"/>
+                <a:cs typeface="Calibri" panose="020F0502020204030204" pitchFamily="34" charset="0"/>
+              </a:rPr>
+              <a:t>и </a:t>
+            </a:r>
+            <a:r>
+              <a:rPr lang="en-US" sz="2600" i="1" noProof="1">
+                <a:solidFill>
+                  <a:srgbClr val="00B050"/>
+                </a:solidFill>
+                <a:cs typeface="Consolas" panose="020B0609020204030204" pitchFamily="49" charset="0"/>
+              </a:rPr>
+              <a:t>nums2</a:t>
             </a:r>
             <a:endParaRPr lang="bg-BG" dirty="0">
               <a:solidFill>
                 <a:srgbClr val="234465"/>
               </a:solidFill>
-              <a:latin typeface="Consolas"/>
+              <a:cs typeface="Consolas" panose="020B0609020204030204" pitchFamily="49" charset="0"/>
             </a:endParaRPr>
           </a:p>
           <a:p>
@@ -15590,16 +16132,55 @@
                 </a:solidFill>
                 <a:latin typeface="Consolas"/>
               </a:rPr>
-              <a:t>  // TODO: Д</a:t>
+              <a:t>  // </a:t>
             </a:r>
             <a:r>
               <a:rPr lang="en-GB" sz="2600" i="1" noProof="1">
                 <a:solidFill>
                   <a:srgbClr val="00B050"/>
                 </a:solidFill>
+                <a:latin typeface="Calibri" panose="020F0502020204030204" pitchFamily="34" charset="0"/>
+                <a:cs typeface="Calibri" panose="020F0502020204030204" pitchFamily="34" charset="0"/>
+              </a:rPr>
+              <a:t>TODO:</a:t>
+            </a:r>
+            <a:r>
+              <a:rPr lang="en-GB" sz="2600" noProof="1">
+                <a:solidFill>
+                  <a:srgbClr val="00B050"/>
+                </a:solidFill>
                 <a:latin typeface="Consolas"/>
               </a:rPr>
-              <a:t>а се добавят числата resultNums</a:t>
+              <a:t> </a:t>
+            </a:r>
+            <a:r>
+              <a:rPr lang="en-GB" sz="2600" i="1" noProof="1">
+                <a:solidFill>
+                  <a:srgbClr val="00B050"/>
+                </a:solidFill>
+                <a:latin typeface="Calibri" panose="020F0502020204030204" pitchFamily="34" charset="0"/>
+                <a:cs typeface="Calibri" panose="020F0502020204030204" pitchFamily="34" charset="0"/>
+              </a:rPr>
+              <a:t>Да се добавят числата </a:t>
+            </a:r>
+            <a:r>
+              <a:rPr lang="bg-BG" sz="2600" i="1" noProof="1">
+                <a:solidFill>
+                  <a:srgbClr val="00B050"/>
+                </a:solidFill>
+                <a:latin typeface="Calibri" panose="020F0502020204030204" pitchFamily="34" charset="0"/>
+                <a:cs typeface="Calibri" panose="020F0502020204030204" pitchFamily="34" charset="0"/>
+              </a:rPr>
+              <a:t>в правилния ред към </a:t>
+            </a:r>
+            <a:r>
+              <a:rPr lang="en-GB" sz="2600" i="1" noProof="1">
+                <a:solidFill>
+                  <a:srgbClr val="00B050"/>
+                </a:solidFill>
+                <a:latin typeface="Consolas"/>
+              </a:rPr>
+              <a:t>resultNums</a:t>
             </a:r>
           </a:p>
           <a:p>
@@ -16224,7 +16805,7 @@
                 <a:ea typeface="+mj-lt"/>
                 <a:cs typeface="+mj-lt"/>
               </a:rPr>
-              <a:t>Обединяване на списъци</a:t>
+              <a:t>Обединяване на списъци </a:t>
             </a:r>
             <a:r>
               <a:rPr lang="en-GB" sz="3950" dirty="0"/>
@@ -16268,7 +16849,21 @@
                 <a:ea typeface="+mn-lt"/>
                 <a:cs typeface="+mn-lt"/>
               </a:rPr>
-              <a:t>Тествайте решението в Judge</a:t>
+              <a:t>Тествайте решението</a:t>
+            </a:r>
+            <a:r>
+              <a:rPr lang="bg-BG" sz="1950" dirty="0">
+                <a:ea typeface="+mn-lt"/>
+                <a:cs typeface="+mn-lt"/>
+              </a:rPr>
+              <a:t> си</a:t>
+            </a:r>
+            <a:r>
+              <a:rPr lang="en-US" sz="1950" dirty="0">
+                <a:ea typeface="+mn-lt"/>
+                <a:cs typeface="+mn-lt"/>
+              </a:rPr>
+              <a:t> в Judge</a:t>
             </a:r>
             <a:r>
               <a:rPr lang="en-US" sz="1950" dirty="0"/>
@@ -17119,28 +17714,14 @@
                 <a:ea typeface="+mj-lt"/>
                 <a:cs typeface="+mj-lt"/>
               </a:rPr>
-              <a:t>Сортиране на спис</a:t>
+              <a:t>Сортиране на </a:t>
             </a:r>
             <a:r>
               <a:rPr lang="bg-BG" sz="5350" dirty="0">
                 <a:ea typeface="+mj-lt"/>
                 <a:cs typeface="+mj-lt"/>
               </a:rPr>
-              <a:t>ъци</a:t>
-            </a:r>
-            <a:r>
-              <a:rPr lang="en-US" sz="5350" dirty="0">
-                <a:ea typeface="+mj-lt"/>
-                <a:cs typeface="+mj-lt"/>
-              </a:rPr>
-              <a:t> и масив</a:t>
-            </a:r>
-            <a:r>
-              <a:rPr lang="bg-BG" sz="5350" dirty="0">
-                <a:ea typeface="+mj-lt"/>
-                <a:cs typeface="+mj-lt"/>
-              </a:rPr>
-              <a:t>и</a:t>
+              <a:t>списък</a:t>
             </a:r>
             <a:endParaRPr lang="bg-BG" dirty="0"/>
           </a:p>
@@ -17213,7 +17794,24 @@
             </a:pPr>
             <a:r>
               <a:rPr lang="bg-BG" dirty="0"/>
-              <a:t>Списъци</a:t>
+              <a:t>Списък</a:t>
+            </a:r>
+          </a:p>
+          <a:p>
+            <a:pPr marL="746433" lvl="1" indent="-457200">
+              <a:lnSpc>
+                <a:spcPct val="114000"/>
+              </a:lnSpc>
+              <a:spcBef>
+                <a:spcPts val="1200"/>
+              </a:spcBef>
+            </a:pPr>
+            <a:r>
+              <a:rPr lang="bg-BG" dirty="0">
+                <a:ea typeface="+mn-lt"/>
+                <a:cs typeface="+mn-lt"/>
+              </a:rPr>
+              <a:t>Манипулиране на списък</a:t>
             </a:r>
           </a:p>
           <a:p>
@@ -17228,12 +17826,12 @@
               <a:buAutoNum type="arabicPeriod"/>
             </a:pPr>
             <a:r>
-              <a:rPr lang="bg-BG" dirty="0">
-                <a:ea typeface="+mn-lt"/>
-                <a:cs typeface="+mn-lt"/>
-              </a:rPr>
-              <a:t>Манипулиране на списък</a:t>
-            </a:r>
+              <a:rPr lang="bg-BG" dirty="0"/>
+              <a:t>Четене и отпечатване на списък</a:t>
+            </a:r>
+            <a:endParaRPr lang="bg-BG" dirty="0">
+              <a:cs typeface="Calibri"/>
+            </a:endParaRPr>
           </a:p>
           <a:p>
             <a:pPr marL="445770" indent="-445770">
@@ -17248,26 +17846,7 @@
             </a:pPr>
             <a:r>
               <a:rPr lang="bg-BG" dirty="0"/>
-              <a:t>Четене на списък от конзолата</a:t>
-            </a:r>
-            <a:endParaRPr lang="bg-BG" dirty="0">
-              <a:cs typeface="Calibri"/>
-            </a:endParaRPr>
-          </a:p>
-          <a:p>
-            <a:pPr marL="445770" indent="-445770">
-              <a:lnSpc>
-                <a:spcPct val="114000"/>
-              </a:lnSpc>
-              <a:spcBef>
-                <a:spcPts val="1200"/>
-              </a:spcBef>
-              <a:buFontTx/>
-              <a:buAutoNum type="arabicPeriod"/>
-            </a:pPr>
-            <a:r>
-              <a:rPr lang="bg-BG" dirty="0"/>
-              <a:t>Сортиране на списък и масив</a:t>
+              <a:t>Сортиране на списък</a:t>
             </a:r>
             <a:endParaRPr lang="bg-BG" dirty="0">
               <a:cs typeface="Calibri"/>
@@ -17487,7 +18066,7 @@
                                         <p:tgtEl>
                                           <p:spTgt spid="444419">
                                             <p:txEl>
-                                              <p:pRg st="1" end="1"/>
+                                              <p:pRg st="2" end="2"/>
                                             </p:txEl>
                                           </p:spTgt>
                                         </p:tgtEl>
@@ -17529,55 +18108,6 @@
                                     <p:set>
                                       <p:cBhvr>
                                         <p:cTn id="10" dur="1" fill="hold">
-                                          <p:stCondLst>
-                                            <p:cond delay="0"/>
-                                          </p:stCondLst>
-                                        </p:cTn>
-                                        <p:tgtEl>
-                                          <p:spTgt spid="444419">
-                                            <p:txEl>
-                                              <p:pRg st="2" end="2"/>
-                                            </p:txEl>
-                                          </p:spTgt>
-                                        </p:tgtEl>
-                                        <p:attrNameLst>
-                                          <p:attrName>style.visibility</p:attrName>
-                                        </p:attrNameLst>
-                                      </p:cBhvr>
-                                      <p:to>
-                                        <p:strVal val="visible"/>
-                                      </p:to>
-                                    </p:set>
-                                  </p:childTnLst>
-                                </p:cTn>
-                              </p:par>
-                            </p:childTnLst>
-                          </p:cTn>
-                        </p:par>
-                      </p:childTnLst>
-                    </p:cTn>
-                  </p:par>
-                  <p:par>
-                    <p:cTn id="11" fill="hold">
-                      <p:stCondLst>
-                        <p:cond delay="indefinite"/>
-                      </p:stCondLst>
-                      <p:childTnLst>
-                        <p:par>
-                          <p:cTn id="12" fill="hold">
-                            <p:stCondLst>
-                              <p:cond delay="0"/>
-                            </p:stCondLst>
-                            <p:childTnLst>
-                              <p:par>
-                                <p:cTn id="13" presetID="1" presetClass="entr" presetSubtype="0" fill="hold" nodeType="clickEffect">
-                                  <p:stCondLst>
-                                    <p:cond delay="0"/>
-                                  </p:stCondLst>
-                                  <p:childTnLst>
-                                    <p:set>
-                                      <p:cBhvr>
-                                        <p:cTn id="14" dur="1" fill="hold">
                                           <p:stCondLst>
                                             <p:cond delay="0"/>
                                           </p:stCondLst>
@@ -17660,7 +18190,7 @@
         </p:nvSpPr>
         <p:spPr>
           <a:xfrm>
-            <a:off x="336000" y="1190245"/>
+            <a:off x="336000" y="1224000"/>
             <a:ext cx="12227528" cy="5562885"/>
           </a:xfrm>
         </p:spPr>
@@ -17694,7 +18224,17 @@
                 <a:ea typeface="+mn-lt"/>
                 <a:cs typeface="+mn-lt"/>
               </a:rPr>
-              <a:t> списъци </a:t>
+              <a:t> </a:t>
+            </a:r>
+            <a:r>
+              <a:rPr lang="bg-BG" sz="3000" b="1" dirty="0">
+                <a:solidFill>
+                  <a:schemeClr val="bg1"/>
+                </a:solidFill>
+                <a:ea typeface="+mn-lt"/>
+                <a:cs typeface="+mn-lt"/>
+              </a:rPr>
+              <a:t>списък </a:t>
             </a:r>
             <a:r>
               <a:rPr lang="en-US" sz="3000" dirty="0"/>
@@ -17709,8 +18249,8 @@
                 <a:solidFill>
                   <a:schemeClr val="bg1"/>
                 </a:solidFill>
-                <a:latin typeface="Calibri"/>
-                <a:cs typeface="Calibri"/>
+                <a:latin typeface="Consolas" panose="020B0609020204030204" pitchFamily="49" charset="0"/>
+                <a:cs typeface="Consolas" panose="020B0609020204030204" pitchFamily="49" charset="0"/>
               </a:rPr>
               <a:t>Sort()</a:t>
             </a:r>
@@ -17719,8 +18259,8 @@
                 <a:solidFill>
                   <a:srgbClr val="234465"/>
                 </a:solidFill>
-                <a:latin typeface="Calibri"/>
-                <a:cs typeface="Calibri"/>
+                <a:latin typeface="Consolas" panose="020B0609020204030204" pitchFamily="49" charset="0"/>
+                <a:cs typeface="Consolas" panose="020B0609020204030204" pitchFamily="49" charset="0"/>
               </a:rPr>
               <a:t> </a:t>
             </a:r>
@@ -17728,7 +18268,8 @@
               <a:solidFill>
                 <a:schemeClr val="bg1"/>
               </a:solidFill>
-              <a:latin typeface="Consolas"/>
+              <a:latin typeface="Consolas" panose="020B0609020204030204" pitchFamily="49" charset="0"/>
+              <a:cs typeface="Consolas" panose="020B0609020204030204" pitchFamily="49" charset="0"/>
             </a:endParaRPr>
           </a:p>
           <a:p>
@@ -17743,7 +18284,35 @@
                   <a:srgbClr val="234465"/>
                 </a:solidFill>
               </a:rPr>
-              <a:t>Елементите трябва да могат да се </a:t>
+              <a:t>Елементите</a:t>
+            </a:r>
+            <a:r>
+              <a:rPr lang="bg-BG" sz="3000" dirty="0">
+                <a:solidFill>
+                  <a:srgbClr val="234465"/>
+                </a:solidFill>
+              </a:rPr>
+              <a:t> (</a:t>
+            </a:r>
+            <a:r>
+              <a:rPr lang="bg-BG" sz="3000" dirty="0"/>
+              <a:t>напр.</a:t>
+            </a:r>
+            <a:r>
+              <a:rPr lang="en-US" sz="3000" dirty="0"/>
+              <a:t> числа, низове, дати</a:t>
+            </a:r>
+            <a:r>
+              <a:rPr lang="bg-BG" sz="3000" dirty="0"/>
+              <a:t>)</a:t>
+            </a:r>
+            <a:r>
+              <a:rPr lang="en-US" sz="3000" dirty="0">
+                <a:solidFill>
+                  <a:srgbClr val="234465"/>
+                </a:solidFill>
+              </a:rPr>
+              <a:t> трябва да могат да се </a:t>
             </a:r>
             <a:r>
               <a:rPr lang="en-US" sz="3000" b="1" dirty="0">
@@ -17754,8 +18323,8 @@
               <a:t>сравняват</a:t>
             </a:r>
             <a:r>
-              <a:rPr lang="en-US" sz="3000" dirty="0"/>
-              <a:t>, например числа, низове, дати, …</a:t>
+              <a:rPr lang="bg-BG" sz="3000" dirty="0"/>
+              <a:t>:</a:t>
             </a:r>
             <a:endParaRPr lang="en-US" sz="3000" dirty="0">
               <a:cs typeface="Calibri"/>
@@ -17780,7 +18349,11 @@
           <a:p>
             <a:r>
               <a:rPr lang="en-GB" sz="3950" dirty="0"/>
-              <a:t>Сортиране на списъци</a:t>
+              <a:t>Сортиране на </a:t>
+            </a:r>
+            <a:r>
+              <a:rPr lang="bg-BG" sz="3950" dirty="0"/>
+              <a:t>списък</a:t>
             </a:r>
             <a:endParaRPr lang="bg-BG" dirty="0"/>
           </a:p>
@@ -18037,7 +18610,7 @@
         <p:spPr bwMode="auto">
           <a:xfrm>
             <a:off x="3888768" y="3800545"/>
-            <a:ext cx="2936097" cy="746833"/>
+            <a:ext cx="2936097" cy="798455"/>
           </a:xfrm>
           <a:prstGeom prst="wedgeRoundRectCallout">
             <a:avLst>
@@ -18089,10 +18662,21 @@
             <a:r>
               <a:rPr lang="en-US" sz="2400" b="1" noProof="1">
                 <a:solidFill>
+                  <a:schemeClr val="bg1">
+                    <a:lumMod val="60000"/>
+                    <a:lumOff val="40000"/>
+                  </a:schemeClr>
+                </a:solidFill>
+              </a:rPr>
+              <a:t>Сортиране</a:t>
+            </a:r>
+            <a:r>
+              <a:rPr lang="en-US" sz="2400" b="1" noProof="1">
+                <a:solidFill>
                   <a:schemeClr val="bg2"/>
                 </a:solidFill>
               </a:rPr>
-              <a:t>Сортиране във възходящ ред</a:t>
+              <a:t> във възходящ ред</a:t>
             </a:r>
             <a:endParaRPr lang="bg-BG" dirty="0">
               <a:solidFill>
@@ -18113,12 +18697,12 @@
         <p:spPr bwMode="auto">
           <a:xfrm>
             <a:off x="4071528" y="4999566"/>
-            <a:ext cx="3009707" cy="669285"/>
+            <a:ext cx="3009707" cy="798455"/>
           </a:xfrm>
           <a:prstGeom prst="wedgeRoundRectCallout">
             <a:avLst>
-              <a:gd name="adj1" fmla="val -58538"/>
-              <a:gd name="adj2" fmla="val 38843"/>
+              <a:gd name="adj1" fmla="val -58259"/>
+              <a:gd name="adj2" fmla="val 23083"/>
               <a:gd name="adj3" fmla="val 16667"/>
             </a:avLst>
           </a:prstGeom>
@@ -18165,10 +18749,21 @@
             <a:r>
               <a:rPr lang="en-US" sz="2400" b="1" noProof="1">
                 <a:solidFill>
+                  <a:schemeClr val="bg1">
+                    <a:lumMod val="60000"/>
+                    <a:lumOff val="40000"/>
+                  </a:schemeClr>
+                </a:solidFill>
+              </a:rPr>
+              <a:t>Обръщане</a:t>
+            </a:r>
+            <a:r>
+              <a:rPr lang="en-US" sz="2400" b="1" noProof="1">
+                <a:solidFill>
                   <a:schemeClr val="bg2"/>
                 </a:solidFill>
               </a:rPr>
-              <a:t>Обръщане на сортирания списък</a:t>
+              <a:t> на сортирания списък</a:t>
             </a:r>
             <a:endParaRPr lang="bg-BG" dirty="0">
               <a:solidFill>
@@ -18799,8 +19394,8 @@
         </p:nvSpPr>
         <p:spPr>
           <a:xfrm>
-            <a:off x="191940" y="1196706"/>
-            <a:ext cx="11996988" cy="5199712"/>
+            <a:off x="135000" y="1196706"/>
+            <a:ext cx="12126000" cy="5199712"/>
           </a:xfrm>
         </p:spPr>
         <p:txBody>
@@ -18810,25 +19405,28 @@
           <a:lstStyle/>
           <a:p>
             <a:pPr marL="360045" indent="-360045">
+              <a:lnSpc>
+                <a:spcPct val="100000"/>
+              </a:lnSpc>
               <a:buFont typeface="Wingdings"/>
               <a:buChar char="§"/>
             </a:pPr>
             <a:r>
-              <a:rPr lang="en-US" sz="3600" dirty="0">
+              <a:rPr lang="en-US" sz="3400" dirty="0">
                 <a:ea typeface="+mn-lt"/>
                 <a:cs typeface="+mn-lt"/>
               </a:rPr>
               <a:t>Прочетете числото</a:t>
             </a:r>
             <a:r>
-              <a:rPr lang="en-US" sz="3600" b="1" dirty="0">
+              <a:rPr lang="en-US" sz="3400" b="1" dirty="0">
                 <a:ea typeface="+mn-lt"/>
                 <a:cs typeface="+mn-lt"/>
               </a:rPr>
               <a:t> </a:t>
             </a:r>
             <a:r>
-              <a:rPr lang="en-US" sz="3600" b="1" dirty="0">
+              <a:rPr lang="en-US" sz="3400" b="1" dirty="0">
                 <a:solidFill>
                   <a:schemeClr val="bg1"/>
                 </a:solidFill>
@@ -18838,42 +19436,71 @@
               <a:t>n</a:t>
             </a:r>
             <a:r>
-              <a:rPr lang="en-US" sz="3600" dirty="0">
+              <a:rPr lang="en-US" sz="3400" dirty="0">
                 <a:ea typeface="+mn-lt"/>
                 <a:cs typeface="+mn-lt"/>
               </a:rPr>
-              <a:t> и след това n на брой редове от</a:t>
-            </a:r>
-            <a:endParaRPr lang="bg-BG" dirty="0">
-              <a:solidFill>
-                <a:srgbClr val="FFA000"/>
-              </a:solidFill>
-              <a:ea typeface="+mn-lt"/>
-              <a:cs typeface="+mn-lt"/>
-            </a:endParaRPr>
-          </a:p>
-          <a:p>
-            <a:pPr marL="0" indent="0">
-              <a:buNone/>
-            </a:pPr>
-            <a:r>
-              <a:rPr lang="en-US" sz="3600" dirty="0">
+              <a:t> и след това n на брой </a:t>
+            </a:r>
+            <a:r>
+              <a:rPr lang="bg-BG" sz="3400" dirty="0">
                 <a:ea typeface="+mn-lt"/>
                 <a:cs typeface="+mn-lt"/>
               </a:rPr>
-              <a:t> </a:t>
-            </a:r>
-            <a:r>
-              <a:rPr lang="en-US" sz="3600" b="1" dirty="0">
-                <a:solidFill>
-                  <a:schemeClr val="bg1"/>
-                </a:solidFill>
+              <a:t>реда</a:t>
+            </a:r>
+            <a:r>
+              <a:rPr lang="en-US" sz="3400" dirty="0">
                 <a:ea typeface="+mn-lt"/>
                 <a:cs typeface="+mn-lt"/>
               </a:rPr>
-              <a:t>продукти</a:t>
-            </a:r>
-            <a:endParaRPr lang="bg-BG" b="1" dirty="0">
+              <a:t> </a:t>
+            </a:r>
+            <a:r>
+              <a:rPr lang="bg-BG" sz="3400" dirty="0">
+                <a:ea typeface="+mn-lt"/>
+                <a:cs typeface="+mn-lt"/>
+              </a:rPr>
+              <a:t>с</a:t>
+            </a:r>
+            <a:r>
+              <a:rPr lang="en-US" sz="3400" dirty="0">
+                <a:ea typeface="+mn-lt"/>
+                <a:cs typeface="+mn-lt"/>
+              </a:rPr>
+              <a:t> </a:t>
+            </a:r>
+            <a:r>
+              <a:rPr lang="en-US" sz="3400" b="1" dirty="0">
+                <a:solidFill>
+                  <a:schemeClr val="bg1"/>
+                </a:solidFill>
+                <a:ea typeface="+mn-lt"/>
+                <a:cs typeface="+mn-lt"/>
+              </a:rPr>
+              <a:t>продук</a:t>
+            </a:r>
+            <a:r>
+              <a:rPr lang="bg-BG" sz="3400" b="1" dirty="0">
+                <a:solidFill>
+                  <a:schemeClr val="bg1"/>
+                </a:solidFill>
+                <a:ea typeface="+mn-lt"/>
+                <a:cs typeface="+mn-lt"/>
+              </a:rPr>
+              <a:t>т</a:t>
+            </a:r>
+            <a:r>
+              <a:rPr lang="en-US" sz="3400" b="1" dirty="0">
+                <a:solidFill>
+                  <a:schemeClr val="bg1"/>
+                </a:solidFill>
+                <a:ea typeface="+mn-lt"/>
+                <a:cs typeface="+mn-lt"/>
+              </a:rPr>
+              <a:t>и</a:t>
+            </a:r>
+            <a:endParaRPr lang="bg-BG" sz="3400" b="1" dirty="0">
               <a:solidFill>
                 <a:schemeClr val="bg1"/>
               </a:solidFill>
@@ -18882,50 +19509,88 @@
           <a:p>
             <a:pPr lvl="1" indent="-360045"/>
             <a:r>
-              <a:rPr lang="en-US" sz="3400" dirty="0">
+              <a:rPr lang="bg-BG" sz="3200" dirty="0">
                 <a:ea typeface="+mn-lt"/>
                 <a:cs typeface="+mn-lt"/>
               </a:rPr>
-              <a:t>Принтирайте </a:t>
-            </a:r>
-            <a:r>
-              <a:rPr lang="en-US" sz="3400" b="1" dirty="0">
-                <a:solidFill>
-                  <a:schemeClr val="bg1"/>
-                </a:solidFill>
+              <a:t>Отпечатайте</a:t>
+            </a:r>
+            <a:r>
+              <a:rPr lang="en-US" sz="3200" dirty="0">
                 <a:ea typeface="+mn-lt"/>
                 <a:cs typeface="+mn-lt"/>
               </a:rPr>
-              <a:t>номериран списък</a:t>
-            </a:r>
-            <a:r>
-              <a:rPr lang="en-US" sz="3400" dirty="0">
+              <a:t> </a:t>
+            </a:r>
+            <a:r>
+              <a:rPr lang="en-US" sz="3200" b="1" dirty="0">
+                <a:solidFill>
+                  <a:schemeClr val="bg1"/>
+                </a:solidFill>
                 <a:ea typeface="+mn-lt"/>
                 <a:cs typeface="+mn-lt"/>
               </a:rPr>
-              <a:t>, който съдържа всички продукти подредени по име и</a:t>
-            </a:r>
-            <a:r>
-              <a:rPr lang="en-US" sz="3400" dirty="0">
-                <a:solidFill>
-                  <a:srgbClr val="234465"/>
-                </a:solidFill>
+              <a:t>номериран списък</a:t>
+            </a:r>
+            <a:r>
+              <a:rPr lang="en-US" sz="3200" dirty="0">
                 <a:ea typeface="+mn-lt"/>
                 <a:cs typeface="+mn-lt"/>
               </a:rPr>
-              <a:t> </a:t>
-            </a:r>
-            <a:r>
-              <a:rPr lang="en-US" sz="3400" b="1" dirty="0">
-                <a:solidFill>
-                  <a:schemeClr val="bg1"/>
-                </a:solidFill>
+              <a:t>, който съдържа всички продукти</a:t>
+            </a:r>
+            <a:r>
+              <a:rPr lang="bg-BG" sz="3200" dirty="0">
                 <a:ea typeface="+mn-lt"/>
                 <a:cs typeface="+mn-lt"/>
               </a:rPr>
+              <a:t>,</a:t>
+            </a:r>
+            <a:r>
+              <a:rPr lang="en-US" sz="3200" dirty="0">
+                <a:ea typeface="+mn-lt"/>
+                <a:cs typeface="+mn-lt"/>
+              </a:rPr>
+              <a:t> подредени по </a:t>
+            </a:r>
+            <a:r>
+              <a:rPr lang="en-US" sz="3200" b="1" dirty="0">
+                <a:solidFill>
+                  <a:schemeClr val="bg1"/>
+                </a:solidFill>
+                <a:ea typeface="+mn-lt"/>
+                <a:cs typeface="+mn-lt"/>
+              </a:rPr>
+              <a:t>име</a:t>
+            </a:r>
+            <a:r>
+              <a:rPr lang="en-US" sz="3200" dirty="0">
+                <a:ea typeface="+mn-lt"/>
+                <a:cs typeface="+mn-lt"/>
+              </a:rPr>
+              <a:t> и</a:t>
+            </a:r>
+            <a:r>
+              <a:rPr lang="en-US" sz="3200" dirty="0">
+                <a:solidFill>
+                  <a:srgbClr val="234465"/>
+                </a:solidFill>
+                <a:ea typeface="+mn-lt"/>
+                <a:cs typeface="+mn-lt"/>
+              </a:rPr>
+              <a:t> </a:t>
+            </a:r>
+            <a:r>
+              <a:rPr lang="en-US" sz="3200" b="1" dirty="0">
+                <a:solidFill>
+                  <a:schemeClr val="bg1"/>
+                </a:solidFill>
+                <a:ea typeface="+mn-lt"/>
+                <a:cs typeface="+mn-lt"/>
+              </a:rPr>
               <a:t>по азбучен ред</a:t>
             </a:r>
-            <a:endParaRPr lang="en-US" sz="3400" b="1" dirty="0">
+            <a:endParaRPr lang="en-US" sz="3200" b="1" dirty="0">
               <a:solidFill>
                 <a:schemeClr val="bg1"/>
               </a:solidFill>
@@ -18934,10 +19599,10 @@
           <a:p>
             <a:pPr marL="360045" indent="-360045"/>
             <a:r>
-              <a:rPr lang="en-US" sz="3600" dirty="0"/>
+              <a:rPr lang="en-US" sz="3400" dirty="0"/>
               <a:t>Примери:</a:t>
             </a:r>
-            <a:endParaRPr lang="bg-BG" sz="3600" dirty="0">
+            <a:endParaRPr lang="bg-BG" sz="3400" dirty="0">
               <a:cs typeface="Calibri"/>
             </a:endParaRPr>
           </a:p>
@@ -18976,7 +19641,7 @@
         </p:nvSpPr>
         <p:spPr bwMode="auto">
           <a:xfrm>
-            <a:off x="3049509" y="3971838"/>
+            <a:off x="3345002" y="3529310"/>
             <a:ext cx="1767818" cy="2834154"/>
           </a:xfrm>
           <a:prstGeom prst="rect">
@@ -19091,7 +19756,7 @@
         </p:nvSpPr>
         <p:spPr bwMode="auto">
           <a:xfrm>
-            <a:off x="5728653" y="4244753"/>
+            <a:off x="6024146" y="3802225"/>
             <a:ext cx="2124644" cy="2280156"/>
           </a:xfrm>
           <a:prstGeom prst="rect">
@@ -19188,7 +19853,7 @@
         </p:nvSpPr>
         <p:spPr>
           <a:xfrm>
-            <a:off x="5051226" y="5157888"/>
+            <a:off x="5346719" y="4715360"/>
             <a:ext cx="587676" cy="473303"/>
           </a:xfrm>
           <a:prstGeom prst="rightArrow">
@@ -19266,7 +19931,7 @@
         </p:nvSpPr>
         <p:spPr>
           <a:xfrm>
-            <a:off x="8738814" y="3885532"/>
+            <a:off x="9034307" y="3443004"/>
             <a:ext cx="1156225" cy="2515761"/>
           </a:xfrm>
           <a:prstGeom prst="rect">
@@ -19460,7 +20125,7 @@
         </p:nvSpPr>
         <p:spPr bwMode="auto">
           <a:xfrm>
-            <a:off x="8050507" y="3971837"/>
+            <a:off x="8346000" y="3529309"/>
             <a:ext cx="742757" cy="2418082"/>
           </a:xfrm>
           <a:prstGeom prst="downArrow">
@@ -19618,7 +20283,7 @@
                                         <p:tgtEl>
                                           <p:spTgt spid="6">
                                             <p:txEl>
-                                              <p:pRg st="3" end="3"/>
+                                              <p:pRg st="2" end="2"/>
                                             </p:txEl>
                                           </p:spTgt>
                                         </p:tgtEl>
@@ -19887,7 +20552,21 @@
                 <a:ea typeface="+mn-lt"/>
                 <a:cs typeface="+mn-lt"/>
               </a:rPr>
-              <a:t>Тествайте решението в Judge</a:t>
+              <a:t>Тествайте решението</a:t>
+            </a:r>
+            <a:r>
+              <a:rPr lang="bg-BG" sz="1950" dirty="0">
+                <a:ea typeface="+mn-lt"/>
+                <a:cs typeface="+mn-lt"/>
+              </a:rPr>
+              <a:t> си</a:t>
+            </a:r>
+            <a:r>
+              <a:rPr lang="en-US" sz="1950" dirty="0">
+                <a:ea typeface="+mn-lt"/>
+                <a:cs typeface="+mn-lt"/>
+              </a:rPr>
+              <a:t> в Judge</a:t>
             </a:r>
             <a:r>
               <a:rPr lang="en-US" sz="1950" dirty="0"/>
@@ -20782,6 +21461,9 @@
           <a:lstStyle/>
           <a:p>
             <a:pPr marL="360045" indent="-360045">
+              <a:lnSpc>
+                <a:spcPct val="100000"/>
+              </a:lnSpc>
               <a:buFont typeface="Wingdings"/>
               <a:buChar char="§"/>
             </a:pPr>
@@ -20798,13 +21480,43 @@
                 </a:solidFill>
                 <a:cs typeface="Calibri"/>
               </a:rPr>
-              <a:t>списък от числа </a:t>
+              <a:t>списък от</a:t>
+            </a:r>
+            <a:r>
+              <a:rPr lang="bg-BG" sz="3600" b="1" dirty="0">
+                <a:solidFill>
+                  <a:schemeClr val="bg1"/>
+                </a:solidFill>
+                <a:cs typeface="Calibri"/>
+              </a:rPr>
+              <a:t> цели</a:t>
+            </a:r>
+            <a:r>
+              <a:rPr lang="en-US" sz="3600" b="1" dirty="0">
+                <a:solidFill>
+                  <a:schemeClr val="bg1"/>
+                </a:solidFill>
+                <a:cs typeface="Calibri"/>
+              </a:rPr>
+              <a:t> числа </a:t>
             </a:r>
             <a:r>
               <a:rPr lang="en-US" sz="3600" dirty="0">
                 <a:cs typeface="Calibri"/>
               </a:rPr>
-              <a:t>и премахнете </a:t>
+              <a:t>и </a:t>
+            </a:r>
+            <a:r>
+              <a:rPr lang="bg-BG" sz="3600" dirty="0">
+                <a:cs typeface="Calibri"/>
+              </a:rPr>
+              <a:t>п</a:t>
+            </a:r>
+            <a:r>
+              <a:rPr lang="en-US" sz="3600" dirty="0">
+                <a:cs typeface="Calibri"/>
+              </a:rPr>
+              <a:t>ремахнете </a:t>
             </a:r>
             <a:r>
               <a:rPr lang="en-US" sz="3600" b="1" dirty="0">
@@ -20824,6 +21536,9 @@
           </a:p>
           <a:p>
             <a:pPr marL="0" indent="0">
+              <a:lnSpc>
+                <a:spcPct val="100000"/>
+              </a:lnSpc>
               <a:buNone/>
             </a:pPr>
             <a:r>
@@ -20850,24 +21565,7 @@
                 <a:ea typeface="+mn-lt"/>
                 <a:cs typeface="+mn-lt"/>
               </a:rPr>
-              <a:t>Принтирайте </a:t>
-            </a:r>
-            <a:r>
-              <a:rPr lang="en-US" sz="3200" b="1" dirty="0">
-                <a:solidFill>
-                  <a:schemeClr val="bg1"/>
-                </a:solidFill>
-                <a:ea typeface="+mn-lt"/>
-                <a:cs typeface="+mn-lt"/>
-              </a:rPr>
-              <a:t>останалите числа</a:t>
-            </a:r>
-            <a:r>
-              <a:rPr lang="en-US" sz="3200" dirty="0">
-                <a:ea typeface="+mn-lt"/>
-                <a:cs typeface="+mn-lt"/>
-              </a:rPr>
-              <a:t> в </a:t>
+              <a:t>Принтирайте останалите числа в </a:t>
             </a:r>
             <a:r>
               <a:rPr lang="en-US" sz="3200" b="1" dirty="0">
@@ -20943,21 +21641,30 @@
         </p:nvSpPr>
         <p:spPr/>
         <p:txBody>
-          <a:bodyPr/>
+          <a:bodyPr>
+            <a:normAutofit/>
+          </a:bodyPr>
           <a:lstStyle/>
           <a:p>
             <a:r>
-              <a:rPr lang="en-US" sz="3950" dirty="0"/>
+              <a:rPr lang="en-US" sz="4000" dirty="0"/>
               <a:t>Задача: </a:t>
             </a:r>
             <a:r>
-              <a:rPr lang="en-US" sz="3950" dirty="0">
+              <a:rPr lang="en-US" sz="4000" dirty="0">
                 <a:ea typeface="+mj-lt"/>
                 <a:cs typeface="+mj-lt"/>
               </a:rPr>
-              <a:t>Премахнете негативите и обърнете</a:t>
-            </a:r>
-            <a:endParaRPr lang="bg-BG" sz="3950" dirty="0"/>
+              <a:t>Премахнете </a:t>
+            </a:r>
+            <a:r>
+              <a:rPr lang="bg-BG" sz="4000" dirty="0">
+                <a:ea typeface="+mj-lt"/>
+                <a:cs typeface="+mj-lt"/>
+              </a:rPr>
+              <a:t>отрицателните числа</a:t>
+            </a:r>
+            <a:endParaRPr lang="bg-BG" sz="4000" dirty="0"/>
           </a:p>
         </p:txBody>
       </p:sp>
@@ -21954,36 +22661,48 @@
             <p:ph type="title"/>
           </p:nvPr>
         </p:nvSpPr>
-        <p:spPr/>
+        <p:spPr>
+          <a:xfrm>
+            <a:off x="21000" y="100750"/>
+            <a:ext cx="10000594" cy="882654"/>
+          </a:xfrm>
+        </p:spPr>
         <p:txBody>
           <a:bodyPr>
-            <a:normAutofit fontScale="90000"/>
+            <a:noAutofit/>
           </a:bodyPr>
           <a:lstStyle/>
           <a:p>
             <a:r>
-              <a:rPr lang="en-GB" sz="3950" dirty="0">
+              <a:rPr lang="en-GB" sz="4000" dirty="0">
                 <a:ea typeface="+mj-lt"/>
                 <a:cs typeface="+mj-lt"/>
               </a:rPr>
               <a:t>Решение</a:t>
             </a:r>
             <a:r>
-              <a:rPr lang="en-US" sz="3950" dirty="0"/>
+              <a:rPr lang="en-US" sz="4000" dirty="0"/>
               <a:t>:</a:t>
             </a:r>
             <a:r>
-              <a:rPr lang="en-US" sz="3950" b="0" dirty="0"/>
+              <a:rPr lang="en-US" sz="4000" b="0" dirty="0"/>
               <a:t> </a:t>
             </a:r>
             <a:r>
-              <a:rPr lang="en-US" sz="3950" dirty="0">
+              <a:rPr lang="en-US" sz="4000" dirty="0">
                 <a:ea typeface="+mj-lt"/>
                 <a:cs typeface="+mj-lt"/>
               </a:rPr>
-              <a:t>Премахнете негативите и обърнете</a:t>
-            </a:r>
-            <a:endParaRPr lang="bg-BG" sz="3950" dirty="0">
+              <a:t>Премахнете </a:t>
+            </a:r>
+            <a:r>
+              <a:rPr lang="bg-BG" sz="4000" dirty="0">
+                <a:ea typeface="+mj-lt"/>
+                <a:cs typeface="+mj-lt"/>
+              </a:rPr>
+              <a:t>отрицателните числа</a:t>
+            </a:r>
+            <a:endParaRPr lang="bg-BG" sz="4000" dirty="0">
               <a:cs typeface="Calibri"/>
             </a:endParaRPr>
           </a:p>
@@ -22023,7 +22742,21 @@
                 <a:ea typeface="+mn-lt"/>
                 <a:cs typeface="+mn-lt"/>
               </a:rPr>
-              <a:t>Тествайте решението в Judge</a:t>
+              <a:t>Тествайте решението</a:t>
+            </a:r>
+            <a:r>
+              <a:rPr lang="bg-BG" sz="1950" dirty="0">
+                <a:ea typeface="+mn-lt"/>
+                <a:cs typeface="+mn-lt"/>
+              </a:rPr>
+              <a:t> си</a:t>
+            </a:r>
+            <a:r>
+              <a:rPr lang="en-US" sz="1950" dirty="0">
+                <a:ea typeface="+mn-lt"/>
+                <a:cs typeface="+mn-lt"/>
+              </a:rPr>
+              <a:t> в Judge</a:t>
             </a:r>
             <a:r>
               <a:rPr lang="en-US" sz="1950" dirty="0"/>
@@ -22257,37 +22990,31 @@
               <a:defRPr/>
             </a:pPr>
             <a:r>
-              <a:rPr lang="en-GB" noProof="1">
-                <a:solidFill>
-                  <a:srgbClr val="FFA000"/>
-                </a:solidFill>
-                <a:latin typeface="Consolas"/>
-              </a:rPr>
-              <a:t>List&lt;int&gt; </a:t>
-            </a:r>
-            <a:r>
-              <a:rPr lang="en-GB" noProof="1">
-                <a:latin typeface="Consolas"/>
-              </a:rPr>
-              <a:t>nums =</a:t>
-            </a:r>
-            <a:r>
-              <a:rPr lang="en-GB" noProof="1">
-                <a:solidFill>
-                  <a:srgbClr val="234465"/>
-                </a:solidFill>
-                <a:latin typeface="Consolas"/>
-              </a:rPr>
-              <a:t> </a:t>
-            </a:r>
-            <a:r>
               <a:rPr lang="en-GB" i="1" noProof="1">
                 <a:solidFill>
                   <a:srgbClr val="00B050"/>
                 </a:solidFill>
                 <a:latin typeface="Calibri"/>
               </a:rPr>
-              <a:t>// TODO: Да се прочете списъка от конзолата</a:t>
+              <a:t>// TODO: Да се прочете списъка </a:t>
+            </a:r>
+            <a:r>
+              <a:rPr lang="en-GB" i="1" noProof="1">
+                <a:solidFill>
+                  <a:srgbClr val="00B050"/>
+                </a:solidFill>
+                <a:cs typeface="Consolas" panose="020B0609020204030204" pitchFamily="49" charset="0"/>
+              </a:rPr>
+              <a:t>nums</a:t>
+            </a:r>
+            <a:r>
+              <a:rPr lang="en-GB" i="1" noProof="1">
+                <a:solidFill>
+                  <a:srgbClr val="00B050"/>
+                </a:solidFill>
+                <a:latin typeface="Calibri"/>
+              </a:rPr>
+              <a:t> от конзолата</a:t>
             </a:r>
             <a:endParaRPr lang="bg-BG" dirty="0"/>
           </a:p>
@@ -23189,7 +23916,7 @@
         </p:spPr>
         <p:txBody>
           <a:bodyPr vert="horz" lIns="107972" tIns="35991" rIns="107972" bIns="35991" rtlCol="0" anchor="t">
-            <a:normAutofit lnSpcReduction="10000"/>
+            <a:normAutofit fontScale="92500" lnSpcReduction="10000"/>
           </a:bodyPr>
           <a:lstStyle>
             <a:lvl1pPr marL="456915" indent="-456915" algn="l" defTabSz="1218438" rtl="0" eaLnBrk="1" latinLnBrk="1" hangingPunct="1">
@@ -23388,11 +24115,54 @@
                 </a:solidFill>
                 <a:cs typeface="Calibri"/>
               </a:rPr>
-              <a:t> съдържат редактируема последователност от елементи (с променлива дължина)</a:t>
-            </a:r>
-            <a:endParaRPr lang="bg-BG" dirty="0">
+              <a:t> съдържат последователност от елементи</a:t>
+            </a:r>
+            <a:endParaRPr lang="bg-BG" sz="3400" dirty="0">
               <a:solidFill>
                 <a:schemeClr val="bg2"/>
+              </a:solidFill>
+              <a:cs typeface="Calibri"/>
+            </a:endParaRPr>
+          </a:p>
+          <a:p>
+            <a:pPr marL="989631" lvl="1" indent="-456565" latinLnBrk="0">
+              <a:lnSpc>
+                <a:spcPct val="100000"/>
+              </a:lnSpc>
+              <a:spcBef>
+                <a:spcPts val="1200"/>
+              </a:spcBef>
+              <a:buClr>
+                <a:schemeClr val="bg2"/>
+              </a:buClr>
+            </a:pPr>
+            <a:r>
+              <a:rPr lang="bg-BG" sz="3200" dirty="0">
+                <a:solidFill>
+                  <a:schemeClr val="bg2"/>
+                </a:solidFill>
+                <a:cs typeface="Calibri"/>
+              </a:rPr>
+              <a:t>Имат </a:t>
+            </a:r>
+            <a:r>
+              <a:rPr lang="en-US" sz="3200" b="1" dirty="0">
+                <a:solidFill>
+                  <a:schemeClr val="bg1">
+                    <a:lumMod val="60000"/>
+                    <a:lumOff val="40000"/>
+                  </a:schemeClr>
+                </a:solidFill>
+                <a:cs typeface="Calibri"/>
+              </a:rPr>
+              <a:t>променлива дължина</a:t>
+            </a:r>
+            <a:endParaRPr lang="bg-BG" b="1" dirty="0">
+              <a:solidFill>
+                <a:schemeClr val="bg1">
+                  <a:lumMod val="60000"/>
+                  <a:lumOff val="40000"/>
+                </a:schemeClr>
               </a:solidFill>
               <a:cs typeface="Calibri"/>
             </a:endParaRPr>
@@ -23804,7 +24574,7 @@
                                         <p:tgtEl>
                                           <p:spTgt spid="15">
                                             <p:txEl>
-                                              <p:pRg st="1" end="1"/>
+                                              <p:pRg st="2" end="2"/>
                                             </p:txEl>
                                           </p:spTgt>
                                         </p:tgtEl>
@@ -23853,7 +24623,7 @@
                                         <p:tgtEl>
                                           <p:spTgt spid="15">
                                             <p:txEl>
-                                              <p:pRg st="2" end="2"/>
+                                              <p:pRg st="3" end="3"/>
                                             </p:txEl>
                                           </p:spTgt>
                                         </p:tgtEl>
@@ -23902,7 +24672,7 @@
                                         <p:tgtEl>
                                           <p:spTgt spid="15">
                                             <p:txEl>
-                                              <p:pRg st="3" end="3"/>
+                                              <p:pRg st="4" end="4"/>
                                             </p:txEl>
                                           </p:spTgt>
                                         </p:tgtEl>
@@ -23951,7 +24721,7 @@
                                         <p:tgtEl>
                                           <p:spTgt spid="15">
                                             <p:txEl>
-                                              <p:pRg st="4" end="4"/>
+                                              <p:pRg st="5" end="5"/>
                                             </p:txEl>
                                           </p:spTgt>
                                         </p:tgtEl>
@@ -24000,7 +24770,7 @@
                                         <p:tgtEl>
                                           <p:spTgt spid="15">
                                             <p:txEl>
-                                              <p:pRg st="5" end="5"/>
+                                              <p:pRg st="6" end="6"/>
                                             </p:txEl>
                                           </p:spTgt>
                                         </p:tgtEl>
@@ -25252,7 +26022,7 @@
             </a:r>
             <a:r>
               <a:rPr lang="bg-BG" dirty="0"/>
-              <a:t>ци</a:t>
+              <a:t>к</a:t>
             </a:r>
             <a:endParaRPr lang="en-GB" dirty="0"/>
           </a:p>
@@ -25298,6 +26068,87 @@
       </p:grpSpPr>
       <p:sp>
         <p:nvSpPr>
+          <p:cNvPr id="3" name="Content Placeholder 2"/>
+          <p:cNvSpPr>
+            <a:spLocks noGrp="1"/>
+          </p:cNvSpPr>
+          <p:nvPr>
+            <p:ph type="body" sz="quarter" idx="10"/>
+          </p:nvPr>
+        </p:nvSpPr>
+        <p:spPr>
+          <a:xfrm>
+            <a:off x="2086766" y="1121143"/>
+            <a:ext cx="10129234" cy="5546589"/>
+          </a:xfrm>
+        </p:spPr>
+        <p:txBody>
+          <a:bodyPr vert="horz" lIns="108000" tIns="36000" rIns="108000" bIns="36000" rtlCol="0" anchor="t">
+            <a:normAutofit/>
+          </a:bodyPr>
+          <a:lstStyle/>
+          <a:p>
+            <a:pPr marL="360045" indent="-360045">
+              <a:buClr>
+                <a:schemeClr val="tx1"/>
+              </a:buClr>
+            </a:pPr>
+            <a:r>
+              <a:rPr lang="en-US" sz="3350" b="1" dirty="0">
+                <a:solidFill>
+                  <a:schemeClr val="bg1"/>
+                </a:solidFill>
+                <a:latin typeface="Consolas"/>
+              </a:rPr>
+              <a:t>List&lt;T&gt;</a:t>
+            </a:r>
+            <a:r>
+              <a:rPr lang="en-US" sz="3350" dirty="0"/>
+              <a:t> </a:t>
+            </a:r>
+            <a:r>
+              <a:rPr lang="bg-BG" sz="3350" dirty="0"/>
+              <a:t>е списък от елементи с еднакъв тип данни</a:t>
+            </a:r>
+          </a:p>
+          <a:p>
+            <a:pPr marL="360045" indent="-360045">
+              <a:buClr>
+                <a:schemeClr val="tx1"/>
+              </a:buClr>
+            </a:pPr>
+            <a:r>
+              <a:rPr lang="bg-BG" sz="3350" dirty="0">
+                <a:solidFill>
+                  <a:srgbClr val="234465"/>
+                </a:solidFill>
+                <a:latin typeface="Calibri"/>
+                <a:cs typeface="Calibri"/>
+              </a:rPr>
+              <a:t>За разлика от масива, списъкът има </a:t>
+            </a:r>
+            <a:r>
+              <a:rPr lang="bg-BG" sz="3350" b="1" dirty="0">
+                <a:solidFill>
+                  <a:schemeClr val="bg1"/>
+                </a:solidFill>
+                <a:latin typeface="Calibri"/>
+                <a:cs typeface="Calibri"/>
+              </a:rPr>
+              <a:t>променлива дължина</a:t>
+            </a:r>
+            <a:endParaRPr lang="bg-BG" sz="3350" dirty="0">
+              <a:solidFill>
+                <a:schemeClr val="bg1"/>
+              </a:solidFill>
+              <a:latin typeface="Calibri"/>
+              <a:cs typeface="Calibri"/>
+            </a:endParaRPr>
+          </a:p>
+        </p:txBody>
+      </p:sp>
+      <p:sp>
+        <p:nvSpPr>
           <p:cNvPr id="4" name="Title 3"/>
           <p:cNvSpPr>
             <a:spLocks noGrp="1"/>
@@ -25325,60 +26176,6 @@
       </p:sp>
       <p:sp>
         <p:nvSpPr>
-          <p:cNvPr id="3" name="Content Placeholder 2"/>
-          <p:cNvSpPr>
-            <a:spLocks noGrp="1"/>
-          </p:cNvSpPr>
-          <p:nvPr>
-            <p:ph type="body" sz="quarter" idx="10"/>
-          </p:nvPr>
-        </p:nvSpPr>
-        <p:spPr>
-          <a:xfrm>
-            <a:off x="1430430" y="1044000"/>
-            <a:ext cx="10515017" cy="5546589"/>
-          </a:xfrm>
-        </p:spPr>
-        <p:txBody>
-          <a:bodyPr vert="horz" lIns="108000" tIns="36000" rIns="108000" bIns="36000" rtlCol="0" anchor="t">
-            <a:normAutofit/>
-          </a:bodyPr>
-          <a:lstStyle/>
-          <a:p>
-            <a:pPr marL="360045" indent="-360045">
-              <a:buClr>
-                <a:schemeClr val="tx1"/>
-              </a:buClr>
-            </a:pPr>
-            <a:r>
-              <a:rPr lang="en-US" sz="3350" b="1" dirty="0">
-                <a:solidFill>
-                  <a:schemeClr val="bg1"/>
-                </a:solidFill>
-                <a:latin typeface="Consolas"/>
-              </a:rPr>
-              <a:t>List&lt;T&gt;</a:t>
-            </a:r>
-            <a:r>
-              <a:rPr lang="en-US" sz="3350" dirty="0"/>
-              <a:t> </a:t>
-            </a:r>
-            <a:r>
-              <a:rPr lang="bg-BG" sz="3350" dirty="0"/>
-              <a:t>е списък от елементи с еднакъв тип от данни</a:t>
-            </a:r>
-            <a:endParaRPr lang="bg-BG" sz="3350" dirty="0">
-              <a:solidFill>
-                <a:srgbClr val="234465"/>
-              </a:solidFill>
-              <a:latin typeface="Calibri"/>
-              <a:cs typeface="Calibri"/>
-            </a:endParaRPr>
-          </a:p>
-        </p:txBody>
-      </p:sp>
-      <p:sp>
-        <p:nvSpPr>
           <p:cNvPr id="9" name="Text Placeholder 5"/>
           <p:cNvSpPr txBox="1">
             <a:spLocks/>
@@ -25387,8 +26184,8 @@
         </p:nvSpPr>
         <p:spPr>
           <a:xfrm>
-            <a:off x="2528127" y="1743855"/>
-            <a:ext cx="8805884" cy="4880868"/>
+            <a:off x="2555116" y="3483012"/>
+            <a:ext cx="8805884" cy="2510988"/>
           </a:xfrm>
           <a:prstGeom prst="rect">
             <a:avLst/>
@@ -25536,7 +26333,43 @@
                 </a:solidFill>
                 <a:latin typeface="Consolas"/>
               </a:rPr>
-              <a:t>// Създаване на списък от низове</a:t>
+              <a:t>// Създаване на </a:t>
+            </a:r>
+            <a:r>
+              <a:rPr lang="bg-BG" sz="2400" i="1" dirty="0">
+                <a:solidFill>
+                  <a:schemeClr val="accent2"/>
+                </a:solidFill>
+                <a:latin typeface="Consolas"/>
+              </a:rPr>
+              <a:t>празен </a:t>
+            </a:r>
+            <a:r>
+              <a:rPr lang="en-US" sz="2400" i="1" dirty="0">
+                <a:solidFill>
+                  <a:schemeClr val="accent2"/>
+                </a:solidFill>
+                <a:latin typeface="Consolas"/>
+              </a:rPr>
+              <a:t>списък </a:t>
+            </a:r>
+            <a:r>
+              <a:rPr lang="bg-BG" sz="2400" i="1" dirty="0">
+                <a:solidFill>
+                  <a:schemeClr val="accent2"/>
+                </a:solidFill>
+                <a:latin typeface="Consolas"/>
+              </a:rPr>
+              <a:t>с </a:t>
+            </a:r>
+            <a:r>
+              <a:rPr lang="en-US" sz="2400" i="1" dirty="0">
+                <a:solidFill>
+                  <a:schemeClr val="accent2"/>
+                </a:solidFill>
+                <a:latin typeface="Consolas"/>
+              </a:rPr>
+              <a:t>низове</a:t>
             </a:r>
             <a:endParaRPr lang="en-US" sz="2400" dirty="0">
               <a:solidFill>
@@ -25590,6 +26423,119 @@
               </a:rPr>
               <a:t>;</a:t>
             </a:r>
+            <a:endParaRPr lang="bg-BG" sz="2400" dirty="0">
+              <a:solidFill>
+                <a:schemeClr val="tx1"/>
+              </a:solidFill>
+              <a:latin typeface="Consolas"/>
+            </a:endParaRPr>
+          </a:p>
+          <a:p>
+            <a:pPr>
+              <a:spcBef>
+                <a:spcPts val="300"/>
+              </a:spcBef>
+              <a:spcAft>
+                <a:spcPts val="300"/>
+              </a:spcAft>
+            </a:pPr>
+            <a:endParaRPr lang="bg-BG" sz="2400" dirty="0">
+              <a:solidFill>
+                <a:schemeClr val="tx1"/>
+              </a:solidFill>
+              <a:latin typeface="Consolas"/>
+            </a:endParaRPr>
+          </a:p>
+          <a:p>
+            <a:pPr>
+              <a:spcBef>
+                <a:spcPts val="300"/>
+              </a:spcBef>
+              <a:spcAft>
+                <a:spcPts val="300"/>
+              </a:spcAft>
+            </a:pPr>
+            <a:r>
+              <a:rPr lang="bg-BG" sz="2400" i="1" dirty="0">
+                <a:solidFill>
+                  <a:schemeClr val="accent2"/>
+                </a:solidFill>
+                <a:latin typeface="Consolas"/>
+              </a:rPr>
+              <a:t>// Създаване на списък с 3 цели числа</a:t>
+            </a:r>
+          </a:p>
+          <a:p>
+            <a:pPr>
+              <a:spcBef>
+                <a:spcPts val="300"/>
+              </a:spcBef>
+              <a:spcAft>
+                <a:spcPts val="300"/>
+              </a:spcAft>
+            </a:pPr>
+            <a:r>
+              <a:rPr lang="en-US" sz="2400" dirty="0">
+                <a:solidFill>
+                  <a:schemeClr val="bg1"/>
+                </a:solidFill>
+              </a:rPr>
+              <a:t>List&lt;int&gt;</a:t>
+            </a:r>
+            <a:r>
+              <a:rPr lang="en-US" sz="2400" dirty="0">
+                <a:solidFill>
+                  <a:schemeClr val="tx1"/>
+                </a:solidFill>
+              </a:rPr>
+              <a:t> grades = </a:t>
+            </a:r>
+            <a:r>
+              <a:rPr lang="en-US" sz="2400" dirty="0">
+                <a:solidFill>
+                  <a:schemeClr val="bg1"/>
+                </a:solidFill>
+              </a:rPr>
+              <a:t>new List&lt;int&gt; {</a:t>
+            </a:r>
+            <a:r>
+              <a:rPr lang="en-US" sz="2400" dirty="0">
+                <a:solidFill>
+                  <a:schemeClr val="tx1"/>
+                </a:solidFill>
+              </a:rPr>
+              <a:t> 6, 4, 5</a:t>
+            </a:r>
+            <a:r>
+              <a:rPr lang="bg-BG" sz="2400" dirty="0">
+                <a:solidFill>
+                  <a:schemeClr val="tx1"/>
+                </a:solidFill>
+              </a:rPr>
+              <a:t> </a:t>
+            </a:r>
+            <a:r>
+              <a:rPr lang="en-US" sz="2400" dirty="0">
+                <a:solidFill>
+                  <a:schemeClr val="bg1"/>
+                </a:solidFill>
+              </a:rPr>
+              <a:t>}</a:t>
+            </a:r>
+            <a:r>
+              <a:rPr lang="en-US" sz="2400" dirty="0">
+                <a:solidFill>
+                  <a:schemeClr val="tx1"/>
+                </a:solidFill>
+              </a:rPr>
+              <a:t>;</a:t>
+            </a:r>
+            <a:endParaRPr lang="en-US" sz="2400" dirty="0">
+              <a:solidFill>
+                <a:schemeClr val="tx1"/>
+              </a:solidFill>
+              <a:latin typeface="Consolas"/>
+            </a:endParaRPr>
           </a:p>
           <a:p>
             <a:pPr>
@@ -25606,330 +26552,6 @@
               </a:solidFill>
               <a:latin typeface="Consolas"/>
             </a:endParaRPr>
-          </a:p>
-          <a:p>
-            <a:pPr>
-              <a:spcBef>
-                <a:spcPts val="300"/>
-              </a:spcBef>
-              <a:spcAft>
-                <a:spcPts val="300"/>
-              </a:spcAft>
-            </a:pPr>
-            <a:r>
-              <a:rPr lang="en-US" sz="2400" i="1" dirty="0">
-                <a:solidFill>
-                  <a:schemeClr val="accent2"/>
-                </a:solidFill>
-                <a:latin typeface="Consolas"/>
-              </a:rPr>
-              <a:t>// Добавяне на елементи</a:t>
-            </a:r>
-            <a:endParaRPr lang="en-US" sz="2400" dirty="0"/>
-          </a:p>
-          <a:p>
-            <a:pPr>
-              <a:spcBef>
-                <a:spcPts val="300"/>
-              </a:spcBef>
-              <a:spcAft>
-                <a:spcPts val="300"/>
-              </a:spcAft>
-            </a:pPr>
-            <a:r>
-              <a:rPr lang="en-US" sz="2400" dirty="0">
-                <a:solidFill>
-                  <a:schemeClr val="tx1"/>
-                </a:solidFill>
-                <a:latin typeface="Consolas"/>
-              </a:rPr>
-              <a:t>names.</a:t>
-            </a:r>
-            <a:r>
-              <a:rPr lang="en-US" sz="2400" dirty="0">
-                <a:solidFill>
-                  <a:schemeClr val="bg1"/>
-                </a:solidFill>
-                <a:latin typeface="Consolas"/>
-              </a:rPr>
-              <a:t>Add(</a:t>
-            </a:r>
-            <a:r>
-              <a:rPr lang="en-US" sz="2400" dirty="0">
-                <a:solidFill>
-                  <a:schemeClr val="tx1"/>
-                </a:solidFill>
-                <a:latin typeface="Consolas"/>
-              </a:rPr>
-              <a:t>"Peter"</a:t>
-            </a:r>
-            <a:r>
-              <a:rPr lang="en-US" sz="2400" dirty="0">
-                <a:solidFill>
-                  <a:schemeClr val="bg1"/>
-                </a:solidFill>
-                <a:latin typeface="Consolas"/>
-              </a:rPr>
-              <a:t>)</a:t>
-            </a:r>
-            <a:r>
-              <a:rPr lang="en-US" sz="2400" dirty="0">
-                <a:solidFill>
-                  <a:schemeClr val="tx1"/>
-                </a:solidFill>
-                <a:latin typeface="Consolas"/>
-              </a:rPr>
-              <a:t>;         </a:t>
-            </a:r>
-            <a:endParaRPr lang="en-US" sz="2400" dirty="0">
-              <a:solidFill>
-                <a:schemeClr val="tx1"/>
-              </a:solidFill>
-            </a:endParaRPr>
-          </a:p>
-          <a:p>
-            <a:pPr>
-              <a:spcBef>
-                <a:spcPts val="300"/>
-              </a:spcBef>
-              <a:spcAft>
-                <a:spcPts val="300"/>
-              </a:spcAft>
-            </a:pPr>
-            <a:r>
-              <a:rPr lang="en-US" sz="2400" dirty="0">
-                <a:solidFill>
-                  <a:schemeClr val="tx1"/>
-                </a:solidFill>
-                <a:latin typeface="Consolas"/>
-              </a:rPr>
-              <a:t>names.</a:t>
-            </a:r>
-            <a:r>
-              <a:rPr lang="en-US" sz="2400" dirty="0">
-                <a:solidFill>
-                  <a:schemeClr val="bg1"/>
-                </a:solidFill>
-                <a:latin typeface="Consolas"/>
-              </a:rPr>
-              <a:t>Add(</a:t>
-            </a:r>
-            <a:r>
-              <a:rPr lang="en-US" sz="2400" dirty="0">
-                <a:solidFill>
-                  <a:schemeClr val="tx1"/>
-                </a:solidFill>
-                <a:latin typeface="Consolas"/>
-              </a:rPr>
-              <a:t>"Maria"</a:t>
-            </a:r>
-            <a:r>
-              <a:rPr lang="en-US" sz="2400" dirty="0">
-                <a:solidFill>
-                  <a:schemeClr val="bg1"/>
-                </a:solidFill>
-                <a:latin typeface="Consolas"/>
-              </a:rPr>
-              <a:t>)</a:t>
-            </a:r>
-            <a:r>
-              <a:rPr lang="en-US" sz="2400" dirty="0">
-                <a:solidFill>
-                  <a:schemeClr val="tx1"/>
-                </a:solidFill>
-                <a:latin typeface="Consolas"/>
-              </a:rPr>
-              <a:t>;</a:t>
-            </a:r>
-          </a:p>
-          <a:p>
-            <a:pPr>
-              <a:spcBef>
-                <a:spcPts val="300"/>
-              </a:spcBef>
-              <a:spcAft>
-                <a:spcPts val="300"/>
-              </a:spcAft>
-            </a:pPr>
-            <a:r>
-              <a:rPr lang="en-US" sz="2400" dirty="0">
-                <a:solidFill>
-                  <a:schemeClr val="tx1"/>
-                </a:solidFill>
-                <a:latin typeface="Consolas"/>
-              </a:rPr>
-              <a:t>names.</a:t>
-            </a:r>
-            <a:r>
-              <a:rPr lang="en-US" sz="2400" dirty="0">
-                <a:solidFill>
-                  <a:schemeClr val="bg1"/>
-                </a:solidFill>
-                <a:latin typeface="Consolas"/>
-              </a:rPr>
-              <a:t>Add(</a:t>
-            </a:r>
-            <a:r>
-              <a:rPr lang="en-US" sz="2400" dirty="0">
-                <a:solidFill>
-                  <a:schemeClr val="tx1"/>
-                </a:solidFill>
-                <a:latin typeface="Consolas"/>
-              </a:rPr>
-              <a:t>"George"</a:t>
-            </a:r>
-            <a:r>
-              <a:rPr lang="en-US" sz="2400" dirty="0">
-                <a:solidFill>
-                  <a:schemeClr val="bg1"/>
-                </a:solidFill>
-                <a:latin typeface="Consolas"/>
-              </a:rPr>
-              <a:t>)</a:t>
-            </a:r>
-            <a:r>
-              <a:rPr lang="en-US" sz="2400" dirty="0">
-                <a:solidFill>
-                  <a:schemeClr val="tx1"/>
-                </a:solidFill>
-                <a:latin typeface="Consolas"/>
-              </a:rPr>
-              <a:t>;</a:t>
-            </a:r>
-          </a:p>
-          <a:p>
-            <a:pPr>
-              <a:spcBef>
-                <a:spcPts val="300"/>
-              </a:spcBef>
-              <a:spcAft>
-                <a:spcPts val="300"/>
-              </a:spcAft>
-            </a:pPr>
-            <a:endParaRPr lang="en-US" sz="400" dirty="0">
-              <a:solidFill>
-                <a:schemeClr val="tx1"/>
-              </a:solidFill>
-              <a:latin typeface="Consolas"/>
-            </a:endParaRPr>
-          </a:p>
-          <a:p>
-            <a:pPr>
-              <a:spcBef>
-                <a:spcPts val="300"/>
-              </a:spcBef>
-              <a:spcAft>
-                <a:spcPts val="300"/>
-              </a:spcAft>
-            </a:pPr>
-            <a:r>
-              <a:rPr lang="en-US" sz="2400" i="1" dirty="0">
-                <a:solidFill>
-                  <a:schemeClr val="accent2"/>
-                </a:solidFill>
-                <a:latin typeface="Consolas"/>
-              </a:rPr>
-              <a:t>// Отпечатване на елементите</a:t>
-            </a:r>
-            <a:endParaRPr lang="en-US" sz="2400" dirty="0">
-              <a:solidFill>
-                <a:schemeClr val="tx1"/>
-              </a:solidFill>
-              <a:latin typeface="Consolas"/>
-            </a:endParaRPr>
-          </a:p>
-          <a:p>
-            <a:pPr>
-              <a:spcBef>
-                <a:spcPts val="300"/>
-              </a:spcBef>
-              <a:spcAft>
-                <a:spcPts val="300"/>
-              </a:spcAft>
-            </a:pPr>
-            <a:r>
-              <a:rPr lang="en-US" sz="2400" dirty="0">
-                <a:solidFill>
-                  <a:schemeClr val="tx1"/>
-                </a:solidFill>
-                <a:latin typeface="Consolas"/>
-              </a:rPr>
-              <a:t>foreach (var name in names)</a:t>
-            </a:r>
-          </a:p>
-          <a:p>
-            <a:pPr>
-              <a:spcBef>
-                <a:spcPts val="300"/>
-              </a:spcBef>
-              <a:spcAft>
-                <a:spcPts val="300"/>
-              </a:spcAft>
-            </a:pPr>
-            <a:r>
-              <a:rPr lang="en-US" sz="2400" dirty="0">
-                <a:solidFill>
-                  <a:schemeClr val="tx1"/>
-                </a:solidFill>
-                <a:latin typeface="Consolas"/>
-              </a:rPr>
-              <a:t>  Console.WriteLine(name);</a:t>
-            </a:r>
-          </a:p>
-          <a:p>
-            <a:pPr>
-              <a:spcBef>
-                <a:spcPts val="300"/>
-              </a:spcBef>
-              <a:spcAft>
-                <a:spcPts val="300"/>
-              </a:spcAft>
-            </a:pPr>
-            <a:r>
-              <a:rPr lang="en-US" sz="2400" dirty="0">
-                <a:solidFill>
-                  <a:schemeClr val="tx1"/>
-                </a:solidFill>
-                <a:latin typeface="Consolas"/>
-              </a:rPr>
-              <a:t>Console.WriteLine(</a:t>
-            </a:r>
-            <a:r>
-              <a:rPr lang="en-US" sz="2400" dirty="0">
-                <a:solidFill>
-                  <a:schemeClr val="bg1"/>
-                </a:solidFill>
-                <a:latin typeface="Consolas"/>
-              </a:rPr>
-              <a:t>string.Join(</a:t>
-            </a:r>
-            <a:r>
-              <a:rPr lang="en-US" sz="2400" dirty="0">
-                <a:solidFill>
-                  <a:schemeClr val="tx1"/>
-                </a:solidFill>
-                <a:latin typeface="Consolas"/>
-              </a:rPr>
-              <a:t>", ", names</a:t>
-            </a:r>
-            <a:r>
-              <a:rPr lang="en-US" sz="2400" dirty="0">
-                <a:solidFill>
-                  <a:schemeClr val="bg1"/>
-                </a:solidFill>
-                <a:latin typeface="Consolas"/>
-              </a:rPr>
-              <a:t>)</a:t>
-            </a:r>
-            <a:r>
-              <a:rPr lang="en-US" sz="2400" dirty="0">
-                <a:solidFill>
-                  <a:schemeClr val="tx1"/>
-                </a:solidFill>
-                <a:latin typeface="Consolas"/>
-              </a:rPr>
-              <a:t>);</a:t>
-            </a:r>
           </a:p>
         </p:txBody>
       </p:sp>
@@ -26102,7 +26724,7 @@
                             </p:stCondLst>
                             <p:childTnLst>
                               <p:par>
-                                <p:cTn id="5" presetID="1" presetClass="entr" presetSubtype="0" fill="hold" grpId="0" nodeType="clickEffect">
+                                <p:cTn id="5" presetID="1" presetClass="entr" presetSubtype="0" fill="hold" nodeType="clickEffect">
                                   <p:stCondLst>
                                     <p:cond delay="0"/>
                                   </p:stCondLst>
@@ -26110,6 +26732,55 @@
                                     <p:set>
                                       <p:cBhvr>
                                         <p:cTn id="6" dur="1" fill="hold">
+                                          <p:stCondLst>
+                                            <p:cond delay="0"/>
+                                          </p:stCondLst>
+                                        </p:cTn>
+                                        <p:tgtEl>
+                                          <p:spTgt spid="3">
+                                            <p:txEl>
+                                              <p:pRg st="1" end="1"/>
+                                            </p:txEl>
+                                          </p:spTgt>
+                                        </p:tgtEl>
+                                        <p:attrNameLst>
+                                          <p:attrName>style.visibility</p:attrName>
+                                        </p:attrNameLst>
+                                      </p:cBhvr>
+                                      <p:to>
+                                        <p:strVal val="visible"/>
+                                      </p:to>
+                                    </p:set>
+                                  </p:childTnLst>
+                                </p:cTn>
+                              </p:par>
+                            </p:childTnLst>
+                          </p:cTn>
+                        </p:par>
+                      </p:childTnLst>
+                    </p:cTn>
+                  </p:par>
+                  <p:par>
+                    <p:cTn id="7" fill="hold">
+                      <p:stCondLst>
+                        <p:cond delay="indefinite"/>
+                      </p:stCondLst>
+                      <p:childTnLst>
+                        <p:par>
+                          <p:cTn id="8" fill="hold">
+                            <p:stCondLst>
+                              <p:cond delay="0"/>
+                            </p:stCondLst>
+                            <p:childTnLst>
+                              <p:par>
+                                <p:cTn id="9" presetID="1" presetClass="entr" presetSubtype="0" fill="hold" grpId="0" nodeType="clickEffect">
+                                  <p:stCondLst>
+                                    <p:cond delay="0"/>
+                                  </p:stCondLst>
+                                  <p:childTnLst>
+                                    <p:set>
+                                      <p:cBhvr>
+                                        <p:cTn id="10" dur="1" fill="hold">
                                           <p:stCondLst>
                                             <p:cond delay="0"/>
                                           </p:stCondLst>
@@ -26129,14 +26800,14 @@
                                 </p:cTn>
                               </p:par>
                               <p:par>
-                                <p:cTn id="7" presetID="1" presetClass="entr" presetSubtype="0" fill="hold" nodeType="withEffect">
+                                <p:cTn id="11" presetID="1" presetClass="entr" presetSubtype="0" fill="hold" nodeType="withEffect">
                                   <p:stCondLst>
                                     <p:cond delay="0"/>
                                   </p:stCondLst>
                                   <p:childTnLst>
                                     <p:set>
                                       <p:cBhvr>
-                                        <p:cTn id="8" dur="1" fill="hold">
+                                        <p:cTn id="12" dur="1" fill="hold">
                                           <p:stCondLst>
                                             <p:cond delay="0"/>
                                           </p:stCondLst>
@@ -26160,56 +26831,7 @@
                                 </p:cTn>
                               </p:par>
                               <p:par>
-                                <p:cTn id="9" presetID="1" presetClass="entr" presetSubtype="0" fill="hold" nodeType="withEffect">
-                                  <p:stCondLst>
-                                    <p:cond delay="0"/>
-                                  </p:stCondLst>
-                                  <p:childTnLst>
-                                    <p:set>
-                                      <p:cBhvr>
-                                        <p:cTn id="10" dur="1" fill="hold">
-                                          <p:stCondLst>
-                                            <p:cond delay="0"/>
-                                          </p:stCondLst>
-                                        </p:cTn>
-                                        <p:tgtEl>
-                                          <p:spTgt spid="9">
-                                            <p:txEl>
-                                              <p:pRg st="1" end="1"/>
-                                            </p:txEl>
-                                          </p:spTgt>
-                                        </p:tgtEl>
-                                        <p:attrNameLst>
-                                          <p:attrName>style.visibility</p:attrName>
-                                        </p:attrNameLst>
-                                      </p:cBhvr>
-                                      <p:to>
-                                        <p:strVal val="visible"/>
-                                      </p:to>
-                                    </p:set>
-                                  </p:childTnLst>
-                                </p:cTn>
-                              </p:par>
-                            </p:childTnLst>
-                          </p:cTn>
-                        </p:par>
-                      </p:childTnLst>
-                    </p:cTn>
-                  </p:par>
-                  <p:par>
-                    <p:cTn id="11" fill="hold">
-                      <p:stCondLst>
-                        <p:cond delay="indefinite"/>
-                      </p:stCondLst>
-                      <p:childTnLst>
-                        <p:par>
-                          <p:cTn id="12" fill="hold">
-                            <p:stCondLst>
-                              <p:cond delay="0"/>
-                            </p:stCondLst>
-                            <p:childTnLst>
-                              <p:par>
-                                <p:cTn id="13" presetID="1" presetClass="entr" presetSubtype="0" fill="hold" nodeType="clickEffect">
+                                <p:cTn id="13" presetID="1" presetClass="entr" presetSubtype="0" fill="hold" nodeType="withEffect">
                                   <p:stCondLst>
                                     <p:cond delay="0"/>
                                   </p:stCondLst>
@@ -26224,7 +26846,7 @@
                                         <p:tgtEl>
                                           <p:spTgt spid="9">
                                             <p:txEl>
-                                              <p:pRg st="3" end="3"/>
+                                              <p:pRg st="1" end="1"/>
                                             </p:txEl>
                                           </p:spTgt>
                                         </p:tgtEl>
@@ -26255,7 +26877,7 @@
                                         <p:tgtEl>
                                           <p:spTgt spid="9">
                                             <p:txEl>
-                                              <p:pRg st="4" end="4"/>
+                                              <p:pRg st="3" end="3"/>
                                             </p:txEl>
                                           </p:spTgt>
                                         </p:tgtEl>
@@ -26286,180 +26908,7 @@
                                         <p:tgtEl>
                                           <p:spTgt spid="9">
                                             <p:txEl>
-                                              <p:pRg st="5" end="5"/>
-                                            </p:txEl>
-                                          </p:spTgt>
-                                        </p:tgtEl>
-                                        <p:attrNameLst>
-                                          <p:attrName>style.visibility</p:attrName>
-                                        </p:attrNameLst>
-                                      </p:cBhvr>
-                                      <p:to>
-                                        <p:strVal val="visible"/>
-                                      </p:to>
-                                    </p:set>
-                                  </p:childTnLst>
-                                </p:cTn>
-                              </p:par>
-                              <p:par>
-                                <p:cTn id="19" presetID="1" presetClass="entr" presetSubtype="0" fill="hold" nodeType="withEffect">
-                                  <p:stCondLst>
-                                    <p:cond delay="0"/>
-                                  </p:stCondLst>
-                                  <p:childTnLst>
-                                    <p:set>
-                                      <p:cBhvr>
-                                        <p:cTn id="20" dur="1" fill="hold">
-                                          <p:stCondLst>
-                                            <p:cond delay="0"/>
-                                          </p:stCondLst>
-                                        </p:cTn>
-                                        <p:tgtEl>
-                                          <p:spTgt spid="9">
-                                            <p:txEl>
-                                              <p:pRg st="6" end="6"/>
-                                            </p:txEl>
-                                          </p:spTgt>
-                                        </p:tgtEl>
-                                        <p:attrNameLst>
-                                          <p:attrName>style.visibility</p:attrName>
-                                        </p:attrNameLst>
-                                      </p:cBhvr>
-                                      <p:to>
-                                        <p:strVal val="visible"/>
-                                      </p:to>
-                                    </p:set>
-                                  </p:childTnLst>
-                                </p:cTn>
-                              </p:par>
-                            </p:childTnLst>
-                          </p:cTn>
-                        </p:par>
-                      </p:childTnLst>
-                    </p:cTn>
-                  </p:par>
-                  <p:par>
-                    <p:cTn id="21" fill="hold">
-                      <p:stCondLst>
-                        <p:cond delay="indefinite"/>
-                      </p:stCondLst>
-                      <p:childTnLst>
-                        <p:par>
-                          <p:cTn id="22" fill="hold">
-                            <p:stCondLst>
-                              <p:cond delay="0"/>
-                            </p:stCondLst>
-                            <p:childTnLst>
-                              <p:par>
-                                <p:cTn id="23" presetID="1" presetClass="entr" presetSubtype="0" fill="hold" nodeType="clickEffect">
-                                  <p:stCondLst>
-                                    <p:cond delay="0"/>
-                                  </p:stCondLst>
-                                  <p:childTnLst>
-                                    <p:set>
-                                      <p:cBhvr>
-                                        <p:cTn id="24" dur="1" fill="hold">
-                                          <p:stCondLst>
-                                            <p:cond delay="0"/>
-                                          </p:stCondLst>
-                                        </p:cTn>
-                                        <p:tgtEl>
-                                          <p:spTgt spid="9">
-                                            <p:txEl>
-                                              <p:pRg st="8" end="8"/>
-                                            </p:txEl>
-                                          </p:spTgt>
-                                        </p:tgtEl>
-                                        <p:attrNameLst>
-                                          <p:attrName>style.visibility</p:attrName>
-                                        </p:attrNameLst>
-                                      </p:cBhvr>
-                                      <p:to>
-                                        <p:strVal val="visible"/>
-                                      </p:to>
-                                    </p:set>
-                                  </p:childTnLst>
-                                </p:cTn>
-                              </p:par>
-                              <p:par>
-                                <p:cTn id="25" presetID="1" presetClass="entr" presetSubtype="0" fill="hold" nodeType="withEffect">
-                                  <p:stCondLst>
-                                    <p:cond delay="0"/>
-                                  </p:stCondLst>
-                                  <p:childTnLst>
-                                    <p:set>
-                                      <p:cBhvr>
-                                        <p:cTn id="26" dur="1" fill="hold">
-                                          <p:stCondLst>
-                                            <p:cond delay="0"/>
-                                          </p:stCondLst>
-                                        </p:cTn>
-                                        <p:tgtEl>
-                                          <p:spTgt spid="9">
-                                            <p:txEl>
-                                              <p:pRg st="9" end="9"/>
-                                            </p:txEl>
-                                          </p:spTgt>
-                                        </p:tgtEl>
-                                        <p:attrNameLst>
-                                          <p:attrName>style.visibility</p:attrName>
-                                        </p:attrNameLst>
-                                      </p:cBhvr>
-                                      <p:to>
-                                        <p:strVal val="visible"/>
-                                      </p:to>
-                                    </p:set>
-                                  </p:childTnLst>
-                                </p:cTn>
-                              </p:par>
-                              <p:par>
-                                <p:cTn id="27" presetID="1" presetClass="entr" presetSubtype="0" fill="hold" nodeType="withEffect">
-                                  <p:stCondLst>
-                                    <p:cond delay="0"/>
-                                  </p:stCondLst>
-                                  <p:childTnLst>
-                                    <p:set>
-                                      <p:cBhvr>
-                                        <p:cTn id="28" dur="1" fill="hold">
-                                          <p:stCondLst>
-                                            <p:cond delay="0"/>
-                                          </p:stCondLst>
-                                        </p:cTn>
-                                        <p:tgtEl>
-                                          <p:spTgt spid="9">
-                                            <p:txEl>
-                                              <p:pRg st="10" end="10"/>
-                                            </p:txEl>
-                                          </p:spTgt>
-                                        </p:tgtEl>
-                                        <p:attrNameLst>
-                                          <p:attrName>style.visibility</p:attrName>
-                                        </p:attrNameLst>
-                                      </p:cBhvr>
-                                      <p:to>
-                                        <p:strVal val="visible"/>
-                                      </p:to>
-                                    </p:set>
-                                  </p:childTnLst>
-                                </p:cTn>
-                              </p:par>
-                              <p:par>
-                                <p:cTn id="29" presetID="1" presetClass="entr" presetSubtype="0" fill="hold" nodeType="withEffect">
-                                  <p:stCondLst>
-                                    <p:cond delay="0"/>
-                                  </p:stCondLst>
-                                  <p:childTnLst>
-                                    <p:set>
-                                      <p:cBhvr>
-                                        <p:cTn id="30" dur="1" fill="hold">
-                                          <p:stCondLst>
-                                            <p:cond delay="0"/>
-                                          </p:stCondLst>
-                                        </p:cTn>
-                                        <p:tgtEl>
-                                          <p:spTgt spid="9">
-                                            <p:txEl>
-                                              <p:pRg st="11" end="11"/>
+                                              <p:pRg st="4" end="4"/>
                                             </p:txEl>
                                           </p:spTgt>
                                         </p:tgtEl>
@@ -32699,15 +33148,7 @@
                   <a:schemeClr val="tx1"/>
                 </a:solidFill>
               </a:rPr>
-              <a:t> 10, 20, 30, 40, 50, 60</a:t>
-            </a:r>
-            <a:r>
-              <a:rPr lang="bg-BG" sz="2600" dirty="0">
-                <a:solidFill>
-                  <a:schemeClr val="tx1"/>
-                </a:solidFill>
-              </a:rPr>
-              <a:t> </a:t>
+              <a:t> 10, 20, 30, 40, 50, 60 </a:t>
             </a:r>
             <a:r>
               <a:rPr lang="en-US" sz="2600" dirty="0">

</xml_diff>